<commit_message>
modify page 3 and 4
</commit_message>
<xml_diff>
--- a/PPT_Proj1.pptx
+++ b/PPT_Proj1.pptx
@@ -231,7 +231,7 @@
           <a:p>
             <a:fld id="{71BACA97-DCC5-D741-8303-D68B06D997A0}" type="datetimeFigureOut">
               <a:rPr lang="sv-SE" smtClean="0"/>
-              <a:t>2024-02-02</a:t>
+              <a:t>2024-02-05</a:t>
             </a:fld>
             <a:endParaRPr lang="sv-SE"/>
           </a:p>
@@ -802,7 +802,7 @@
           <a:p>
             <a:fld id="{369C0258-E083-684F-B81E-2491FB4EFBD1}" type="datetime1">
               <a:rPr lang="sv-SE" smtClean="0"/>
-              <a:t>2024-02-02</a:t>
+              <a:t>2024-02-05</a:t>
             </a:fld>
             <a:endParaRPr lang="sv-SE"/>
           </a:p>
@@ -1144,7 +1144,7 @@
           <a:p>
             <a:fld id="{08C894E9-0885-714C-A367-BDC2DC59BB91}" type="datetime1">
               <a:rPr lang="sv-SE" smtClean="0"/>
-              <a:t>2024-02-02</a:t>
+              <a:t>2024-02-05</a:t>
             </a:fld>
             <a:endParaRPr lang="sv-SE"/>
           </a:p>
@@ -1578,7 +1578,7 @@
           <a:p>
             <a:fld id="{E926FF3D-704F-D246-9E92-4739AF4BF32C}" type="datetime1">
               <a:rPr lang="sv-SE" smtClean="0"/>
-              <a:t>2024-02-02</a:t>
+              <a:t>2024-02-05</a:t>
             </a:fld>
             <a:endParaRPr lang="sv-SE"/>
           </a:p>
@@ -1791,7 +1791,7 @@
           <a:p>
             <a:fld id="{31CF0965-93C0-9548-8879-5851BCBC049F}" type="datetime1">
               <a:rPr lang="sv-SE" smtClean="0"/>
-              <a:t>2024-02-02</a:t>
+              <a:t>2024-02-05</a:t>
             </a:fld>
             <a:endParaRPr lang="sv-SE"/>
           </a:p>
@@ -2037,7 +2037,7 @@
           <a:p>
             <a:fld id="{E2AD36EE-D7EC-624A-BB6C-F8DADCB0E6B6}" type="datetime1">
               <a:rPr lang="sv-SE" smtClean="0"/>
-              <a:t>2024-02-02</a:t>
+              <a:t>2024-02-05</a:t>
             </a:fld>
             <a:endParaRPr lang="sv-SE"/>
           </a:p>
@@ -2278,7 +2278,7 @@
           <a:p>
             <a:fld id="{CEEB1428-F34F-9743-B7C9-0212F6B23615}" type="datetime1">
               <a:rPr lang="sv-SE" smtClean="0"/>
-              <a:t>2024-02-02</a:t>
+              <a:t>2024-02-05</a:t>
             </a:fld>
             <a:endParaRPr lang="sv-SE"/>
           </a:p>
@@ -2532,7 +2532,7 @@
           <a:p>
             <a:fld id="{117AD585-73D1-4C4C-9D7C-030D27625895}" type="datetime1">
               <a:rPr lang="sv-SE" smtClean="0"/>
-              <a:t>2024-02-02</a:t>
+              <a:t>2024-02-05</a:t>
             </a:fld>
             <a:endParaRPr lang="sv-SE"/>
           </a:p>
@@ -2786,7 +2786,7 @@
           <a:p>
             <a:fld id="{07E8514D-D455-9E46-BC18-4265F6A85EC5}" type="datetime1">
               <a:rPr lang="sv-SE" smtClean="0"/>
-              <a:t>2024-02-02</a:t>
+              <a:t>2024-02-05</a:t>
             </a:fld>
             <a:endParaRPr lang="sv-SE"/>
           </a:p>
@@ -3057,7 +3057,7 @@
           <a:p>
             <a:fld id="{A67A58AE-A0B6-FF4E-B30B-64917FEAC316}" type="datetime1">
               <a:rPr lang="sv-SE" smtClean="0"/>
-              <a:t>2024-02-02</a:t>
+              <a:t>2024-02-05</a:t>
             </a:fld>
             <a:endParaRPr lang="sv-SE"/>
           </a:p>
@@ -3484,7 +3484,7 @@
           <a:p>
             <a:fld id="{3626A2DA-BD88-784C-A132-57FFB928491A}" type="datetime1">
               <a:rPr lang="sv-SE" smtClean="0"/>
-              <a:t>2024-02-02</a:t>
+              <a:t>2024-02-05</a:t>
             </a:fld>
             <a:endParaRPr lang="sv-SE"/>
           </a:p>
@@ -3770,7 +3770,7 @@
           <a:p>
             <a:fld id="{AC15C714-122B-4048-9D2D-1F5A3BEA504A}" type="datetime1">
               <a:rPr lang="sv-SE" smtClean="0"/>
-              <a:t>2024-02-02</a:t>
+              <a:t>2024-02-05</a:t>
             </a:fld>
             <a:endParaRPr lang="sv-SE" dirty="0"/>
           </a:p>
@@ -4152,7 +4152,7 @@
           <a:p>
             <a:fld id="{D7F93862-881E-DF46-AD81-FDB1501BAD48}" type="datetime1">
               <a:rPr lang="sv-SE" smtClean="0"/>
-              <a:t>2024-02-02</a:t>
+              <a:t>2024-02-05</a:t>
             </a:fld>
             <a:endParaRPr lang="sv-SE"/>
           </a:p>
@@ -4629,7 +4629,7 @@
           <a:p>
             <a:fld id="{EE5E874D-60F8-8B45-B36B-3029A6FA7FCB}" type="datetime1">
               <a:rPr lang="sv-SE" smtClean="0"/>
-              <a:t>2024-02-02</a:t>
+              <a:t>2024-02-05</a:t>
             </a:fld>
             <a:endParaRPr lang="sv-SE" dirty="0"/>
           </a:p>
@@ -5091,7 +5091,7 @@
           <a:p>
             <a:fld id="{7FE3A002-8AA0-194E-81B1-1ADE5B52840E}" type="datetime1">
               <a:rPr lang="sv-SE" smtClean="0"/>
-              <a:t>2024-02-02</a:t>
+              <a:t>2024-02-05</a:t>
             </a:fld>
             <a:endParaRPr lang="sv-SE" dirty="0"/>
           </a:p>
@@ -5604,7 +5604,7 @@
           <a:p>
             <a:fld id="{B003E109-5503-A446-83DE-4F0349794E27}" type="datetime1">
               <a:rPr lang="sv-SE" smtClean="0"/>
-              <a:t>2024-02-02</a:t>
+              <a:t>2024-02-05</a:t>
             </a:fld>
             <a:endParaRPr lang="sv-SE" dirty="0"/>
           </a:p>
@@ -6102,7 +6102,7 @@
           <a:p>
             <a:fld id="{1F9706F9-3770-3C47-9C0E-E405B1F87DBD}" type="datetime1">
               <a:rPr lang="sv-SE" smtClean="0"/>
-              <a:t>2024-02-02</a:t>
+              <a:t>2024-02-05</a:t>
             </a:fld>
             <a:endParaRPr lang="sv-SE" dirty="0"/>
           </a:p>
@@ -6564,7 +6564,7 @@
           <a:p>
             <a:fld id="{8E503FC7-D8F6-4243-8CCB-9A739180F56A}" type="datetime1">
               <a:rPr lang="sv-SE" smtClean="0"/>
-              <a:t>2024-02-02</a:t>
+              <a:t>2024-02-05</a:t>
             </a:fld>
             <a:endParaRPr lang="sv-SE" dirty="0"/>
           </a:p>
@@ -7026,7 +7026,7 @@
           <a:p>
             <a:fld id="{9719EDF7-C24A-7E4C-9EBB-98C778ECC35A}" type="datetime1">
               <a:rPr lang="sv-SE" smtClean="0"/>
-              <a:t>2024-02-02</a:t>
+              <a:t>2024-02-05</a:t>
             </a:fld>
             <a:endParaRPr lang="sv-SE" dirty="0"/>
           </a:p>
@@ -7488,7 +7488,7 @@
           <a:p>
             <a:fld id="{6DB96772-CADE-B345-804B-3DF93A11AE0A}" type="datetime1">
               <a:rPr lang="sv-SE" smtClean="0"/>
-              <a:t>2024-02-02</a:t>
+              <a:t>2024-02-05</a:t>
             </a:fld>
             <a:endParaRPr lang="sv-SE" dirty="0"/>
           </a:p>
@@ -7950,7 +7950,7 @@
           <a:p>
             <a:fld id="{669F8B43-28B6-0949-93DC-6B291391CFD4}" type="datetime1">
               <a:rPr lang="sv-SE" smtClean="0"/>
-              <a:t>2024-02-02</a:t>
+              <a:t>2024-02-05</a:t>
             </a:fld>
             <a:endParaRPr lang="sv-SE" dirty="0"/>
           </a:p>
@@ -8170,7 +8170,7 @@
           <a:p>
             <a:fld id="{3450A6BD-1EFB-BD42-9DC0-F0A6BEB4C27D}" type="datetime1">
               <a:rPr lang="sv-SE" smtClean="0"/>
-              <a:t>2024-02-02</a:t>
+              <a:t>2024-02-05</a:t>
             </a:fld>
             <a:endParaRPr lang="sv-SE"/>
           </a:p>
@@ -8461,7 +8461,7 @@
           <a:p>
             <a:fld id="{ADBDFCF2-2839-8D4F-B5E5-9B488CE2E4EE}" type="datetime1">
               <a:rPr lang="sv-SE" smtClean="0"/>
-              <a:t>2024-02-02</a:t>
+              <a:t>2024-02-05</a:t>
             </a:fld>
             <a:endParaRPr lang="sv-SE"/>
           </a:p>
@@ -8825,7 +8825,7 @@
           <a:p>
             <a:fld id="{A1A0D637-CC39-0F47-97F1-76AAE59A5700}" type="datetime1">
               <a:rPr lang="sv-SE" smtClean="0"/>
-              <a:t>2024-02-02</a:t>
+              <a:t>2024-02-05</a:t>
             </a:fld>
             <a:endParaRPr lang="sv-SE"/>
           </a:p>
@@ -9413,7 +9413,7 @@
           <a:p>
             <a:fld id="{47A9746E-62D8-944D-99B0-D98695592DCF}" type="datetime1">
               <a:rPr lang="sv-SE" smtClean="0"/>
-              <a:t>2024-02-02</a:t>
+              <a:t>2024-02-05</a:t>
             </a:fld>
             <a:endParaRPr lang="sv-SE"/>
           </a:p>
@@ -9777,7 +9777,7 @@
           <a:p>
             <a:fld id="{EC42A3C6-0141-7544-8502-44E44E5AD51F}" type="datetime1">
               <a:rPr lang="sv-SE" smtClean="0"/>
-              <a:t>2024-02-02</a:t>
+              <a:t>2024-02-05</a:t>
             </a:fld>
             <a:endParaRPr lang="sv-SE"/>
           </a:p>
@@ -10393,7 +10393,7 @@
           <a:p>
             <a:fld id="{5A8E03F6-2D99-9C4F-8DF5-D169CFDD1A0C}" type="datetime1">
               <a:rPr lang="sv-SE" smtClean="0"/>
-              <a:t>2024-02-02</a:t>
+              <a:t>2024-02-05</a:t>
             </a:fld>
             <a:endParaRPr lang="sv-SE"/>
           </a:p>
@@ -10830,7 +10830,7 @@
           <a:p>
             <a:fld id="{8AF63115-71BE-3E46-BB5A-A4600F1506C7}" type="datetime1">
               <a:rPr lang="sv-SE" smtClean="0"/>
-              <a:t>2024-02-02</a:t>
+              <a:t>2024-02-05</a:t>
             </a:fld>
             <a:endParaRPr lang="sv-SE"/>
           </a:p>
@@ -11603,7 +11603,7 @@
           <a:p>
             <a:fld id="{309FED66-59CE-6445-BA05-B37954B8CE47}" type="datetime1">
               <a:rPr lang="sv-SE" smtClean="0"/>
-              <a:t>2024-02-02</a:t>
+              <a:t>2024-02-05</a:t>
             </a:fld>
             <a:endParaRPr lang="sv-SE"/>
           </a:p>
@@ -11748,7 +11748,7 @@
           <a:p>
             <a:fld id="{8C332B6B-9A86-944B-B689-8453757791DF}" type="datetime1">
               <a:rPr lang="sv-SE" smtClean="0"/>
-              <a:t>2024-02-02</a:t>
+              <a:t>2024-02-05</a:t>
             </a:fld>
             <a:endParaRPr lang="sv-SE" dirty="0"/>
           </a:p>
@@ -11895,7 +11895,7 @@
           <a:p>
             <a:fld id="{1957E16A-1246-F744-BDA8-D5896FB385F8}" type="datetime1">
               <a:rPr lang="sv-SE" smtClean="0"/>
-              <a:t>2024-02-02</a:t>
+              <a:t>2024-02-05</a:t>
             </a:fld>
             <a:endParaRPr lang="sv-SE" dirty="0"/>
           </a:p>
@@ -12080,7 +12080,7 @@
           <a:p>
             <a:fld id="{68888E78-A3E8-2E47-A37C-B0DACC4AC38C}" type="datetime1">
               <a:rPr lang="sv-SE" smtClean="0"/>
-              <a:t>2024-02-02</a:t>
+              <a:t>2024-02-05</a:t>
             </a:fld>
             <a:endParaRPr lang="sv-SE" dirty="0"/>
           </a:p>
@@ -12273,7 +12273,7 @@
           <a:p>
             <a:fld id="{AC1801B8-2ABD-E645-B0F3-2F4D3FFFF5AE}" type="datetime1">
               <a:rPr lang="sv-SE" smtClean="0"/>
-              <a:t>2024-02-02</a:t>
+              <a:t>2024-02-05</a:t>
             </a:fld>
             <a:endParaRPr lang="sv-SE" dirty="0"/>
           </a:p>
@@ -12466,7 +12466,7 @@
           <a:p>
             <a:fld id="{164FA935-6078-184F-946C-D8B2130A7BC4}" type="datetime1">
               <a:rPr lang="sv-SE" smtClean="0"/>
-              <a:t>2024-02-02</a:t>
+              <a:t>2024-02-05</a:t>
             </a:fld>
             <a:endParaRPr lang="sv-SE" dirty="0"/>
           </a:p>
@@ -12827,7 +12827,7 @@
           <a:p>
             <a:fld id="{FC84D86F-77A2-B649-9DAB-4D28280CD96F}" type="datetime1">
               <a:rPr lang="sv-SE" smtClean="0"/>
-              <a:t>2024-02-02</a:t>
+              <a:t>2024-02-05</a:t>
             </a:fld>
             <a:endParaRPr lang="sv-SE"/>
           </a:p>
@@ -12943,7 +12943,7 @@
           <a:p>
             <a:fld id="{878DDE6C-6786-8C48-9317-AF0776715ACF}" type="datetime1">
               <a:rPr lang="sv-SE" smtClean="0"/>
-              <a:t>2024-02-02</a:t>
+              <a:t>2024-02-05</a:t>
             </a:fld>
             <a:endParaRPr lang="sv-SE"/>
           </a:p>
@@ -13160,7 +13160,7 @@
           <a:p>
             <a:fld id="{31CF0965-93C0-9548-8879-5851BCBC049F}" type="datetime1">
               <a:rPr lang="sv-SE" smtClean="0"/>
-              <a:t>2024-02-02</a:t>
+              <a:t>2024-02-05</a:t>
             </a:fld>
             <a:endParaRPr lang="sv-SE"/>
           </a:p>
@@ -13314,7 +13314,7 @@
           <a:p>
             <a:fld id="{31CF0965-93C0-9548-8879-5851BCBC049F}" type="datetime1">
               <a:rPr lang="sv-SE" smtClean="0"/>
-              <a:t>2024-02-02</a:t>
+              <a:t>2024-02-05</a:t>
             </a:fld>
             <a:endParaRPr lang="sv-SE"/>
           </a:p>
@@ -13482,7 +13482,7 @@
           <a:p>
             <a:fld id="{3A3328FD-6257-AC43-9CE4-2903A4D2BB9D}" type="datetime1">
               <a:rPr lang="sv-SE" smtClean="0"/>
-              <a:t>2024-02-02</a:t>
+              <a:t>2024-02-05</a:t>
             </a:fld>
             <a:endParaRPr lang="sv-SE" dirty="0"/>
           </a:p>
@@ -13744,7 +13744,7 @@
           <a:p>
             <a:fld id="{32BABC24-2A82-014C-9256-A51302708EE4}" type="datetime1">
               <a:rPr lang="sv-SE" smtClean="0"/>
-              <a:t>2024-02-02</a:t>
+              <a:t>2024-02-05</a:t>
             </a:fld>
             <a:endParaRPr lang="sv-SE" dirty="0"/>
           </a:p>
@@ -14049,7 +14049,7 @@
           <a:p>
             <a:fld id="{77AA192B-9140-F746-B429-ACF197DC5439}" type="datetime1">
               <a:rPr lang="sv-SE" smtClean="0"/>
-              <a:t>2024-02-02</a:t>
+              <a:t>2024-02-05</a:t>
             </a:fld>
             <a:endParaRPr lang="sv-SE" dirty="0"/>
           </a:p>
@@ -20264,7 +20264,7 @@
           <a:p>
             <a:fld id="{120FD48D-1F42-B341-AF85-AE480DB64991}" type="datetime1">
               <a:rPr lang="sv-SE" smtClean="0"/>
-              <a:t>2024-02-02</a:t>
+              <a:t>2024-02-05</a:t>
             </a:fld>
             <a:endParaRPr lang="sv-SE" dirty="0"/>
           </a:p>
@@ -20824,7 +20824,7 @@
           <a:p>
             <a:fld id="{45830D3C-297D-AF4B-BF84-42155CB091D6}" type="datetime1">
               <a:rPr lang="sv-SE" smtClean="0"/>
-              <a:t>2024-02-02</a:t>
+              <a:t>2024-02-05</a:t>
             </a:fld>
             <a:endParaRPr lang="sv-SE" dirty="0"/>
           </a:p>
@@ -21598,7 +21598,7 @@
           <a:p>
             <a:fld id="{275DBF22-A5DA-3B43-92C3-F6BCD51A4216}" type="datetime1">
               <a:rPr lang="sv-SE" smtClean="0"/>
-              <a:t>2024-02-02</a:t>
+              <a:t>2024-02-05</a:t>
             </a:fld>
             <a:endParaRPr lang="sv-SE"/>
           </a:p>
@@ -21919,7 +21919,7 @@
           <a:p>
             <a:fld id="{230F5ACA-7455-4642-BFE0-35A3360E2D3F}" type="datetime1">
               <a:rPr lang="sv-SE" smtClean="0"/>
-              <a:t>2024-02-02</a:t>
+              <a:t>2024-02-05</a:t>
             </a:fld>
             <a:endParaRPr lang="sv-SE"/>
           </a:p>
@@ -22306,7 +22306,7 @@
           <a:p>
             <a:fld id="{237029E1-9B44-DE43-98B9-EBAFD8B9E3F1}" type="datetime1">
               <a:rPr lang="sv-SE" smtClean="0"/>
-              <a:t>2024-02-02</a:t>
+              <a:t>2024-02-05</a:t>
             </a:fld>
             <a:endParaRPr lang="sv-SE"/>
           </a:p>
@@ -22649,7 +22649,7 @@
           <a:p>
             <a:fld id="{EECCBBAF-5C49-D145-9814-61A8103632A9}" type="datetime1">
               <a:rPr lang="sv-SE" smtClean="0"/>
-              <a:t>2024-02-02</a:t>
+              <a:t>2024-02-05</a:t>
             </a:fld>
             <a:endParaRPr lang="sv-SE"/>
           </a:p>
@@ -23078,7 +23078,7 @@
           <a:p>
             <a:fld id="{823D8581-A4D9-BE4A-AEA5-9282CF05EB42}" type="datetime1">
               <a:rPr lang="sv-SE" smtClean="0"/>
-              <a:t>2024-02-02</a:t>
+              <a:t>2024-02-05</a:t>
             </a:fld>
             <a:endParaRPr lang="sv-SE"/>
           </a:p>
@@ -23338,7 +23338,7 @@
           <a:p>
             <a:fld id="{888E4D63-BE2C-4D4B-BBD2-256262659A9F}" type="datetime1">
               <a:rPr lang="sv-SE" smtClean="0"/>
-              <a:t>2024-02-02</a:t>
+              <a:t>2024-02-05</a:t>
             </a:fld>
             <a:endParaRPr lang="sv-SE" dirty="0"/>
           </a:p>
@@ -25921,8 +25921,8 @@
           </p:sp>
         </mc:Fallback>
       </mc:AlternateContent>
-      <mc:AlternateContent xmlns:mc="http://schemas.openxmlformats.org/markup-compatibility/2006" xmlns:a14="http://schemas.microsoft.com/office/drawing/2010/main">
-        <mc:Choice Requires="a14">
+      <mc:AlternateContent xmlns:mc="http://schemas.openxmlformats.org/markup-compatibility/2006">
+        <mc:Choice xmlns:a14="http://schemas.microsoft.com/office/drawing/2010/main" Requires="a14">
           <p:sp>
             <p:nvSpPr>
               <p:cNvPr id="16" name="文本框 15">
@@ -25937,8 +25937,8 @@
             </p:nvSpPr>
             <p:spPr>
               <a:xfrm>
-                <a:off x="1467954" y="5909583"/>
-                <a:ext cx="9256090" cy="490840"/>
+                <a:off x="894041" y="5782081"/>
+                <a:ext cx="10123177" cy="889346"/>
               </a:xfrm>
               <a:prstGeom prst="rect">
                 <a:avLst/>
@@ -25952,84 +25952,195 @@
               <a:lstStyle/>
               <a:p>
                 <a:pPr algn="ctr"/>
+                <a14:m>
+                  <m:oMath xmlns:m="http://schemas.openxmlformats.org/officeDocument/2006/math">
+                    <m:sSub>
+                      <m:sSubPr>
+                        <m:ctrlPr>
+                          <a:rPr lang="en-US" altLang="zh-CN" sz="2400" i="1">
+                            <a:latin typeface="Cambria Math" panose="02040503050406030204" pitchFamily="18" charset="0"/>
+                          </a:rPr>
+                        </m:ctrlPr>
+                      </m:sSubPr>
+                      <m:e>
+                        <m:r>
+                          <m:rPr>
+                            <m:sty m:val="p"/>
+                          </m:rPr>
+                          <a:rPr lang="el-GR" altLang="zh-CN" sz="2400" i="1">
+                            <a:latin typeface="Cambria Math" panose="02040503050406030204" pitchFamily="18" charset="0"/>
+                            <a:ea typeface="Cambria Math" panose="02040503050406030204" pitchFamily="18" charset="0"/>
+                          </a:rPr>
+                          <m:t>Φ</m:t>
+                        </m:r>
+                      </m:e>
+                      <m:sub>
+                        <m:r>
+                          <a:rPr lang="en-US" altLang="zh-CN" sz="2400" i="1">
+                            <a:latin typeface="Cambria Math" panose="02040503050406030204" pitchFamily="18" charset="0"/>
+                          </a:rPr>
+                          <m:t>𝑥𝑦</m:t>
+                        </m:r>
+                      </m:sub>
+                    </m:sSub>
+                  </m:oMath>
+                </a14:m>
                 <a:r>
-                  <a:rPr lang="en-US" altLang="zh-CN" sz="2400" dirty="0">
-                    <a:latin typeface="CMU Serif" panose="02000603000000000000" pitchFamily="2" charset="0"/>
-                    <a:ea typeface="CMU Serif" panose="02000603000000000000" pitchFamily="2" charset="0"/>
-                    <a:cs typeface="CMU Serif" panose="02000603000000000000" pitchFamily="2" charset="0"/>
-                  </a:rPr>
-                  <a:t>Need to know the </a:t>
+                  <a:rPr lang="en-US" altLang="zh-CN" sz="2400" dirty="0"/>
+                  <a:t>  </a:t>
                 </a:r>
                 <a14:m>
                   <m:oMath xmlns:m="http://schemas.openxmlformats.org/officeDocument/2006/math">
                     <m:sSub>
                       <m:sSubPr>
                         <m:ctrlPr>
-                          <a:rPr lang="en-US" altLang="zh-CN" sz="2400" i="1" dirty="0" smtClean="0">
+                          <a:rPr lang="en-US" altLang="zh-CN" sz="2400" i="1">
                             <a:latin typeface="Cambria Math" panose="02040503050406030204" pitchFamily="18" charset="0"/>
-                            <a:cs typeface="Times New Roman" panose="02020603050405020304" pitchFamily="18" charset="0"/>
                           </a:rPr>
                         </m:ctrlPr>
                       </m:sSubPr>
                       <m:e>
                         <m:r>
-                          <a:rPr lang="en-US" altLang="zh-CN" sz="2400" b="0" i="1" dirty="0" smtClean="0">
+                          <m:rPr>
+                            <m:sty m:val="p"/>
+                          </m:rPr>
+                          <a:rPr lang="el-GR" altLang="zh-CN" sz="2400" i="1">
                             <a:latin typeface="Cambria Math" panose="02040503050406030204" pitchFamily="18" charset="0"/>
-                            <a:cs typeface="Times New Roman" panose="02020603050405020304" pitchFamily="18" charset="0"/>
+                            <a:ea typeface="Cambria Math" panose="02040503050406030204" pitchFamily="18" charset="0"/>
                           </a:rPr>
-                          <m:t>𝑟</m:t>
+                          <m:t>Φ</m:t>
                         </m:r>
                       </m:e>
                       <m:sub>
                         <m:r>
-                          <a:rPr lang="en-US" altLang="zh-CN" sz="2400" b="0" i="1" dirty="0" smtClean="0">
+                          <a:rPr lang="en-US" altLang="zh-CN" sz="2400" i="1">
                             <a:latin typeface="Cambria Math" panose="02040503050406030204" pitchFamily="18" charset="0"/>
-                            <a:cs typeface="Times New Roman" panose="02020603050405020304" pitchFamily="18" charset="0"/>
+                            <a:ea typeface="Cambria Math" panose="02040503050406030204" pitchFamily="18" charset="0"/>
                           </a:rPr>
-                          <m:t>𝑥𝑦</m:t>
+                          <m:t>𝑦</m:t>
+                        </m:r>
+                        <m:r>
+                          <a:rPr lang="en-US" altLang="zh-CN" sz="2400" i="1">
+                            <a:latin typeface="Cambria Math" panose="02040503050406030204" pitchFamily="18" charset="0"/>
+                          </a:rPr>
+                          <m:t>𝑦</m:t>
                         </m:r>
                       </m:sub>
                     </m:sSub>
-                    <m:r>
-                      <a:rPr lang="en-US" altLang="zh-CN" sz="2400" b="0" i="1" dirty="0" smtClean="0">
-                        <a:latin typeface="Cambria Math" panose="02040503050406030204" pitchFamily="18" charset="0"/>
-                        <a:cs typeface="Times New Roman" panose="02020603050405020304" pitchFamily="18" charset="0"/>
-                      </a:rPr>
-                      <m:t>(</m:t>
-                    </m:r>
-                    <m:r>
-                      <a:rPr lang="en-US" altLang="zh-CN" sz="2400" b="0" i="1" dirty="0" smtClean="0">
-                        <a:latin typeface="Cambria Math" panose="02040503050406030204" pitchFamily="18" charset="0"/>
-                        <a:cs typeface="Times New Roman" panose="02020603050405020304" pitchFamily="18" charset="0"/>
-                      </a:rPr>
-                      <m:t>𝑘</m:t>
-                    </m:r>
-                    <m:r>
-                      <a:rPr lang="en-US" altLang="zh-CN" sz="2400" b="0" i="1" dirty="0" smtClean="0">
-                        <a:latin typeface="Cambria Math" panose="02040503050406030204" pitchFamily="18" charset="0"/>
-                        <a:cs typeface="Times New Roman" panose="02020603050405020304" pitchFamily="18" charset="0"/>
-                      </a:rPr>
-                      <m:t>)</m:t>
-                    </m:r>
                   </m:oMath>
                 </a14:m>
                 <a:r>
-                  <a:rPr lang="en-US" altLang="zh-CN" sz="2400" dirty="0">
-                    <a:latin typeface="CMU Serif" panose="02000603000000000000" pitchFamily="2" charset="0"/>
-                    <a:ea typeface="CMU Serif" panose="02000603000000000000" pitchFamily="2" charset="0"/>
-                    <a:cs typeface="CMU Serif" panose="02000603000000000000" pitchFamily="2" charset="0"/>
+                  <a:rPr lang="en-US" altLang="zh-CN" sz="2400" i="1" dirty="0">
+                    <a:latin typeface="Cambria Math" panose="02040503050406030204" pitchFamily="18" charset="0"/>
+                    <a:cs typeface="Times New Roman" panose="02020603050405020304" pitchFamily="18" charset="0"/>
                   </a:rPr>
-                  <a:t> and</a:t>
+                  <a:t>  </a:t>
                 </a:r>
                 <a14:m>
                   <m:oMath xmlns:m="http://schemas.openxmlformats.org/officeDocument/2006/math">
-                    <m:r>
-                      <a:rPr lang="en-US" altLang="zh-CN" sz="2400" b="0" i="0" dirty="0" smtClean="0">
-                        <a:latin typeface="Cambria Math" panose="02040503050406030204" pitchFamily="18" charset="0"/>
-                        <a:cs typeface="Times New Roman" panose="02020603050405020304" pitchFamily="18" charset="0"/>
-                      </a:rPr>
-                      <m:t> </m:t>
-                    </m:r>
+                    <m:sSub>
+                      <m:sSubPr>
+                        <m:ctrlPr>
+                          <a:rPr lang="zh-CN" altLang="en-US" sz="2400" i="1">
+                            <a:latin typeface="Cambria Math" panose="02040503050406030204" pitchFamily="18" charset="0"/>
+                          </a:rPr>
+                        </m:ctrlPr>
+                      </m:sSubPr>
+                      <m:e>
+                        <m:r>
+                          <m:rPr>
+                            <m:sty m:val="p"/>
+                          </m:rPr>
+                          <a:rPr lang="zh-CN" altLang="en-US" sz="2400">
+                            <a:latin typeface="Cambria Math" panose="02040503050406030204" pitchFamily="18" charset="0"/>
+                          </a:rPr>
+                          <m:t>Σ</m:t>
+                        </m:r>
+                      </m:e>
+                      <m:sub>
+                        <m:r>
+                          <a:rPr lang="zh-CN" altLang="en-US" sz="2400" i="1">
+                            <a:latin typeface="Cambria Math" panose="02040503050406030204" pitchFamily="18" charset="0"/>
+                          </a:rPr>
+                          <m:t>𝑥𝑌</m:t>
+                        </m:r>
+                      </m:sub>
+                    </m:sSub>
+                  </m:oMath>
+                </a14:m>
+                <a:r>
+                  <a:rPr lang="en-US" altLang="zh-CN" sz="2400" i="1" dirty="0">
+                    <a:latin typeface="Cambria Math" panose="02040503050406030204" pitchFamily="18" charset="0"/>
+                    <a:cs typeface="Times New Roman" panose="02020603050405020304" pitchFamily="18" charset="0"/>
+                  </a:rPr>
+                  <a:t> </a:t>
+                </a:r>
+                <a14:m>
+                  <m:oMath xmlns:m="http://schemas.openxmlformats.org/officeDocument/2006/math">
+                    <m:sSub>
+                      <m:sSubPr>
+                        <m:ctrlPr>
+                          <a:rPr lang="zh-CN" altLang="en-US" sz="2400" i="1">
+                            <a:latin typeface="Cambria Math" panose="02040503050406030204" pitchFamily="18" charset="0"/>
+                          </a:rPr>
+                        </m:ctrlPr>
+                      </m:sSubPr>
+                      <m:e>
+                        <m:r>
+                          <a:rPr lang="en-US" altLang="zh-CN" sz="2400">
+                            <a:latin typeface="Cambria Math" panose="02040503050406030204" pitchFamily="18" charset="0"/>
+                          </a:rPr>
+                          <m:t> </m:t>
+                        </m:r>
+                        <m:r>
+                          <m:rPr>
+                            <m:sty m:val="p"/>
+                          </m:rPr>
+                          <a:rPr lang="zh-CN" altLang="en-US" sz="2400">
+                            <a:latin typeface="Cambria Math" panose="02040503050406030204" pitchFamily="18" charset="0"/>
+                          </a:rPr>
+                          <m:t>Σ</m:t>
+                        </m:r>
+                      </m:e>
+                      <m:sub>
+                        <m:r>
+                          <a:rPr lang="en-US" altLang="zh-CN" sz="2400" i="1">
+                            <a:latin typeface="Cambria Math" panose="02040503050406030204" pitchFamily="18" charset="0"/>
+                          </a:rPr>
+                          <m:t>𝑌</m:t>
+                        </m:r>
+                        <m:r>
+                          <a:rPr lang="zh-CN" altLang="en-US" sz="2400" i="1">
+                            <a:latin typeface="Cambria Math" panose="02040503050406030204" pitchFamily="18" charset="0"/>
+                          </a:rPr>
+                          <m:t>𝑌</m:t>
+                        </m:r>
+                      </m:sub>
+                    </m:sSub>
+                  </m:oMath>
+                </a14:m>
+                <a:r>
+                  <a:rPr lang="en-US" altLang="zh-CN" sz="2400" i="1" dirty="0">
+                    <a:latin typeface="Cambria Math" panose="02040503050406030204" pitchFamily="18" charset="0"/>
+                    <a:cs typeface="Times New Roman" panose="02020603050405020304" pitchFamily="18" charset="0"/>
+                  </a:rPr>
+                  <a:t> </a:t>
+                </a:r>
+                <a:r>
+                  <a:rPr lang="en-US" altLang="zh-CN" sz="2400" dirty="0">
+                    <a:latin typeface="CMU Serif" panose="02000603000000000000" pitchFamily="2" charset="0"/>
+                    <a:cs typeface="CMU Serif" panose="02000603000000000000" pitchFamily="2" charset="0"/>
+                  </a:rPr>
+                  <a:t>are unknown, we need to compute</a:t>
+                </a:r>
+                <a:r>
+                  <a:rPr lang="en-US" altLang="zh-CN" sz="2400" dirty="0">
+                    <a:cs typeface="Times New Roman" panose="02020603050405020304" pitchFamily="18" charset="0"/>
+                  </a:rPr>
+                  <a:t> </a:t>
+                </a:r>
+                <a14:m>
+                  <m:oMath xmlns:m="http://schemas.openxmlformats.org/officeDocument/2006/math">
                     <m:sSub>
                       <m:sSubPr>
                         <m:ctrlPr>
@@ -26041,7 +26152,7 @@
                       </m:sSubPr>
                       <m:e>
                         <m:r>
-                          <a:rPr lang="en-US" altLang="zh-CN" sz="2400" b="0" i="1" dirty="0" smtClean="0">
+                          <a:rPr lang="en-US" altLang="zh-CN" sz="2400" dirty="0">
                             <a:latin typeface="Cambria Math" panose="02040503050406030204" pitchFamily="18" charset="0"/>
                             <a:cs typeface="Times New Roman" panose="02020603050405020304" pitchFamily="18" charset="0"/>
                           </a:rPr>
@@ -26050,25 +26161,18 @@
                       </m:e>
                       <m:sub>
                         <m:r>
-                          <a:rPr lang="en-US" altLang="zh-CN" sz="2400" b="0" i="1" dirty="0" smtClean="0">
+                          <a:rPr lang="en-US" altLang="zh-CN" sz="2400" dirty="0">
                             <a:latin typeface="Cambria Math" panose="02040503050406030204" pitchFamily="18" charset="0"/>
                             <a:cs typeface="Times New Roman" panose="02020603050405020304" pitchFamily="18" charset="0"/>
                           </a:rPr>
-                          <m:t>𝑦</m:t>
-                        </m:r>
-                        <m:r>
-                          <a:rPr lang="en-US" altLang="zh-CN" sz="2400" i="1" dirty="0">
-                            <a:latin typeface="Cambria Math" panose="02040503050406030204" pitchFamily="18" charset="0"/>
-                            <a:cs typeface="Times New Roman" panose="02020603050405020304" pitchFamily="18" charset="0"/>
-                          </a:rPr>
-                          <m:t>𝑦</m:t>
+                          <m:t>𝑦𝑦</m:t>
                         </m:r>
                       </m:sub>
                     </m:sSub>
                     <m:d>
                       <m:dPr>
                         <m:ctrlPr>
-                          <a:rPr lang="en-US" altLang="zh-CN" sz="2400" b="0" i="1" dirty="0" smtClean="0">
+                          <a:rPr lang="en-US" altLang="zh-CN" sz="2400" i="1" dirty="0">
                             <a:latin typeface="Cambria Math" panose="02040503050406030204" pitchFamily="18" charset="0"/>
                             <a:cs typeface="Times New Roman" panose="02020603050405020304" pitchFamily="18" charset="0"/>
                           </a:rPr>
@@ -26076,7 +26180,65 @@
                       </m:dPr>
                       <m:e>
                         <m:r>
-                          <a:rPr lang="en-US" altLang="zh-CN" sz="2400" b="0" i="1" dirty="0" smtClean="0">
+                          <a:rPr lang="en-US" altLang="zh-CN" sz="2400" dirty="0">
+                            <a:latin typeface="Cambria Math" panose="02040503050406030204" pitchFamily="18" charset="0"/>
+                            <a:cs typeface="Times New Roman" panose="02020603050405020304" pitchFamily="18" charset="0"/>
+                          </a:rPr>
+                          <m:t>𝑘</m:t>
+                        </m:r>
+                      </m:e>
+                    </m:d>
+                  </m:oMath>
+                </a14:m>
+                <a:r>
+                  <a:rPr lang="en-US" altLang="zh-CN" sz="2400" dirty="0">
+                    <a:latin typeface="CMU Serif" panose="02000603000000000000" pitchFamily="2" charset="0"/>
+                    <a:cs typeface="CMU Serif" panose="02000603000000000000" pitchFamily="2" charset="0"/>
+                  </a:rPr>
+                  <a:t> and </a:t>
+                </a:r>
+                <a14:m>
+                  <m:oMath xmlns:m="http://schemas.openxmlformats.org/officeDocument/2006/math">
+                    <m:sSub>
+                      <m:sSubPr>
+                        <m:ctrlPr>
+                          <a:rPr lang="en-US" altLang="zh-CN" sz="2400" i="1" dirty="0">
+                            <a:latin typeface="Cambria Math" panose="02040503050406030204" pitchFamily="18" charset="0"/>
+                            <a:cs typeface="Times New Roman" panose="02020603050405020304" pitchFamily="18" charset="0"/>
+                          </a:rPr>
+                        </m:ctrlPr>
+                      </m:sSubPr>
+                      <m:e>
+                        <m:r>
+                          <a:rPr lang="en-US" altLang="zh-CN" sz="2400" dirty="0">
+                            <a:latin typeface="Cambria Math" panose="02040503050406030204" pitchFamily="18" charset="0"/>
+                            <a:cs typeface="Times New Roman" panose="02020603050405020304" pitchFamily="18" charset="0"/>
+                          </a:rPr>
+                          <m:t>𝑟</m:t>
+                        </m:r>
+                      </m:e>
+                      <m:sub>
+                        <m:r>
+                          <a:rPr lang="en-US" altLang="zh-CN" sz="2400" dirty="0">
+                            <a:latin typeface="Cambria Math" panose="02040503050406030204" pitchFamily="18" charset="0"/>
+                            <a:cs typeface="Times New Roman" panose="02020603050405020304" pitchFamily="18" charset="0"/>
+                          </a:rPr>
+                          <m:t>𝑥𝑦</m:t>
+                        </m:r>
+                      </m:sub>
+                    </m:sSub>
+                    <m:d>
+                      <m:dPr>
+                        <m:ctrlPr>
+                          <a:rPr lang="en-US" altLang="zh-CN" sz="2400" i="1" dirty="0">
+                            <a:latin typeface="Cambria Math" panose="02040503050406030204" pitchFamily="18" charset="0"/>
+                            <a:cs typeface="Times New Roman" panose="02020603050405020304" pitchFamily="18" charset="0"/>
+                          </a:rPr>
+                        </m:ctrlPr>
+                      </m:dPr>
+                      <m:e>
+                        <m:r>
+                          <a:rPr lang="en-US" altLang="zh-CN" sz="2400" dirty="0">
                             <a:latin typeface="Cambria Math" panose="02040503050406030204" pitchFamily="18" charset="0"/>
                             <a:cs typeface="Times New Roman" panose="02020603050405020304" pitchFamily="18" charset="0"/>
                           </a:rPr>
@@ -26092,13 +26254,13 @@
                     <a:ea typeface="CMU Serif" panose="02000603000000000000" pitchFamily="2" charset="0"/>
                     <a:cs typeface="CMU Serif" panose="02000603000000000000" pitchFamily="2" charset="0"/>
                   </a:rPr>
-                  <a:t>, cross/auto correlations</a:t>
+                  <a:t>, cross/auto correlation functions</a:t>
                 </a:r>
               </a:p>
             </p:txBody>
           </p:sp>
         </mc:Choice>
-        <mc:Fallback xmlns="">
+        <mc:Fallback>
           <p:sp>
             <p:nvSpPr>
               <p:cNvPr id="16" name="文本框 15">
@@ -26115,8 +26277,8 @@
             </p:nvSpPr>
             <p:spPr>
               <a:xfrm>
-                <a:off x="1467954" y="5909583"/>
-                <a:ext cx="9256090" cy="490840"/>
+                <a:off x="894041" y="5782081"/>
+                <a:ext cx="10123177" cy="889346"/>
               </a:xfrm>
               <a:prstGeom prst="rect">
                 <a:avLst/>
@@ -26124,7 +26286,7 @@
               <a:blipFill>
                 <a:blip r:embed="rId5"/>
                 <a:stretch>
-                  <a:fillRect t="-3704" b="-27160"/>
+                  <a:fillRect t="-2069" b="-12414"/>
                 </a:stretch>
               </a:blipFill>
             </p:spPr>
@@ -26173,14 +26335,14 @@
           <a:chExt cx="0" cy="0"/>
         </a:xfrm>
       </p:grpSpPr>
-      <mc:AlternateContent xmlns:mc="http://schemas.openxmlformats.org/markup-compatibility/2006" xmlns:a14="http://schemas.microsoft.com/office/drawing/2010/main">
-        <mc:Choice Requires="a14">
+      <mc:AlternateContent xmlns:mc="http://schemas.openxmlformats.org/markup-compatibility/2006">
+        <mc:Choice xmlns:a14="http://schemas.microsoft.com/office/drawing/2010/main" Requires="a14">
           <p:sp>
             <p:nvSpPr>
-              <p:cNvPr id="6" name="文本框 5">
+              <p:cNvPr id="7" name="文本框 6">
                 <a:extLst>
                   <a:ext uri="{FF2B5EF4-FFF2-40B4-BE49-F238E27FC236}">
-                    <a16:creationId xmlns:a16="http://schemas.microsoft.com/office/drawing/2014/main" id="{D9C94A61-1AFD-6E14-CEAC-A39AB3DB6A02}"/>
+                    <a16:creationId xmlns:a16="http://schemas.microsoft.com/office/drawing/2014/main" id="{7CF32BBB-2439-9E67-BD4B-EC6E81BA3129}"/>
                   </a:ext>
                 </a:extLst>
               </p:cNvPr>
@@ -26189,8 +26351,8 @@
             </p:nvSpPr>
             <p:spPr>
               <a:xfrm>
-                <a:off x="2455193" y="1553506"/>
-                <a:ext cx="7281611" cy="495457"/>
+                <a:off x="1403684" y="3077760"/>
+                <a:ext cx="9384631" cy="1997342"/>
               </a:xfrm>
               <a:prstGeom prst="rect">
                 <a:avLst/>
@@ -26203,12 +26365,22 @@
               </a:bodyPr>
               <a:lstStyle/>
               <a:p>
+                <a:pPr marL="342900" indent="-342900">
+                  <a:buFont typeface="Arial" panose="020B0604020202020204" pitchFamily="34" charset="0"/>
+                  <a:buChar char="•"/>
+                </a:pPr>
+                <a:r>
+                  <a:rPr lang="en-US" altLang="zh-CN" sz="2400" dirty="0">
+                    <a:cs typeface="Times New Roman" panose="02020603050405020304" pitchFamily="18" charset="0"/>
+                  </a:rPr>
+                  <a:t>	</a:t>
+                </a:r>
                 <a14:m>
                   <m:oMath xmlns:m="http://schemas.openxmlformats.org/officeDocument/2006/math">
                     <m:sSub>
                       <m:sSubPr>
                         <m:ctrlPr>
-                          <a:rPr lang="en-US" altLang="zh-CN" sz="2400" i="1" dirty="0">
+                          <a:rPr lang="en-US" altLang="zh-CN" sz="2400" b="1" i="1" dirty="0" smtClean="0">
                             <a:latin typeface="Cambria Math" panose="02040503050406030204" pitchFamily="18" charset="0"/>
                             <a:cs typeface="Times New Roman" panose="02020603050405020304" pitchFamily="18" charset="0"/>
                           </a:rPr>
@@ -26216,27 +26388,27 @@
                       </m:sSubPr>
                       <m:e>
                         <m:r>
-                          <a:rPr lang="en-US" altLang="zh-CN" sz="2400" dirty="0">
+                          <a:rPr lang="en-US" altLang="zh-CN" sz="2400" b="1" i="1" dirty="0">
                             <a:latin typeface="Cambria Math" panose="02040503050406030204" pitchFamily="18" charset="0"/>
                             <a:cs typeface="Times New Roman" panose="02020603050405020304" pitchFamily="18" charset="0"/>
                           </a:rPr>
-                          <m:t>𝑟</m:t>
+                          <m:t>𝒓</m:t>
                         </m:r>
                       </m:e>
                       <m:sub>
                         <m:r>
-                          <a:rPr lang="en-US" altLang="zh-CN" sz="2400" dirty="0">
+                          <a:rPr lang="en-US" altLang="zh-CN" sz="2400" b="1" i="1" dirty="0">
                             <a:latin typeface="Cambria Math" panose="02040503050406030204" pitchFamily="18" charset="0"/>
                             <a:cs typeface="Times New Roman" panose="02020603050405020304" pitchFamily="18" charset="0"/>
                           </a:rPr>
-                          <m:t>𝑦𝑦</m:t>
+                          <m:t>𝒚𝒚</m:t>
                         </m:r>
                       </m:sub>
                     </m:sSub>
                     <m:d>
                       <m:dPr>
                         <m:ctrlPr>
-                          <a:rPr lang="en-US" altLang="zh-CN" sz="2400" i="1" dirty="0">
+                          <a:rPr lang="en-US" altLang="zh-CN" sz="2400" b="1" i="1" dirty="0">
                             <a:latin typeface="Cambria Math" panose="02040503050406030204" pitchFamily="18" charset="0"/>
                             <a:cs typeface="Times New Roman" panose="02020603050405020304" pitchFamily="18" charset="0"/>
                           </a:rPr>
@@ -26244,11 +26416,11 @@
                       </m:dPr>
                       <m:e>
                         <m:r>
-                          <a:rPr lang="en-US" altLang="zh-CN" sz="2400" dirty="0">
+                          <a:rPr lang="en-US" altLang="zh-CN" sz="2400" b="1" i="1" dirty="0">
                             <a:latin typeface="Cambria Math" panose="02040503050406030204" pitchFamily="18" charset="0"/>
                             <a:cs typeface="Times New Roman" panose="02020603050405020304" pitchFamily="18" charset="0"/>
                           </a:rPr>
-                          <m:t>𝑘</m:t>
+                          <m:t>𝒌</m:t>
                         </m:r>
                       </m:e>
                     </m:d>
@@ -26369,791 +26541,25 @@
                   </a:rPr>
                   <a:t>directly computable</a:t>
                 </a:r>
-                <a:endParaRPr lang="zh-CN" altLang="en-US" sz="2400" dirty="0">
+              </a:p>
+              <a:p>
+                <a:pPr/>
+                <a:endParaRPr lang="en-US" altLang="zh-CN" sz="2400" dirty="0">
                   <a:latin typeface="CMU Serif" panose="02000603000000000000" pitchFamily="2" charset="0"/>
                   <a:cs typeface="CMU Serif" panose="02000603000000000000" pitchFamily="2" charset="0"/>
                 </a:endParaRPr>
               </a:p>
-            </p:txBody>
-          </p:sp>
-        </mc:Choice>
-        <mc:Fallback xmlns="">
-          <p:sp>
-            <p:nvSpPr>
-              <p:cNvPr id="6" name="文本框 5">
-                <a:extLst>
-                  <a:ext uri="{FF2B5EF4-FFF2-40B4-BE49-F238E27FC236}">
-                    <a16:creationId xmlns:a16="http://schemas.microsoft.com/office/drawing/2014/main" id="{D9C94A61-1AFD-6E14-CEAC-A39AB3DB6A02}"/>
-                  </a:ext>
-                </a:extLst>
-              </p:cNvPr>
-              <p:cNvSpPr txBox="1">
-                <a:spLocks noRot="1" noChangeAspect="1" noMove="1" noResize="1" noEditPoints="1" noAdjustHandles="1" noChangeArrowheads="1" noChangeShapeType="1" noTextEdit="1"/>
-              </p:cNvSpPr>
-              <p:nvPr/>
-            </p:nvSpPr>
-            <p:spPr>
-              <a:xfrm>
-                <a:off x="2455193" y="1553506"/>
-                <a:ext cx="7281611" cy="495457"/>
-              </a:xfrm>
-              <a:prstGeom prst="rect">
-                <a:avLst/>
-              </a:prstGeom>
-              <a:blipFill>
-                <a:blip r:embed="rId2"/>
-                <a:stretch>
-                  <a:fillRect t="-3704" b="-27160"/>
-                </a:stretch>
-              </a:blipFill>
-            </p:spPr>
-            <p:txBody>
-              <a:bodyPr/>
-              <a:lstStyle/>
               <a:p>
-                <a:r>
-                  <a:rPr lang="zh-CN" altLang="en-US">
-                    <a:noFill/>
-                  </a:rPr>
-                  <a:t> </a:t>
-                </a:r>
-              </a:p>
-            </p:txBody>
-          </p:sp>
-        </mc:Fallback>
-      </mc:AlternateContent>
-      <mc:AlternateContent xmlns:mc="http://schemas.openxmlformats.org/markup-compatibility/2006" xmlns:a14="http://schemas.microsoft.com/office/drawing/2010/main">
-        <mc:Choice Requires="a14">
-          <p:sp>
-            <p:nvSpPr>
-              <p:cNvPr id="7" name="文本框 6">
-                <a:extLst>
-                  <a:ext uri="{FF2B5EF4-FFF2-40B4-BE49-F238E27FC236}">
-                    <a16:creationId xmlns:a16="http://schemas.microsoft.com/office/drawing/2014/main" id="{7CF32BBB-2439-9E67-BD4B-EC6E81BA3129}"/>
-                  </a:ext>
-                </a:extLst>
-              </p:cNvPr>
-              <p:cNvSpPr txBox="1"/>
-              <p:nvPr/>
-            </p:nvSpPr>
-            <p:spPr>
-              <a:xfrm>
-                <a:off x="2356433" y="2569380"/>
-                <a:ext cx="8080961" cy="864789"/>
-              </a:xfrm>
-              <a:prstGeom prst="rect">
-                <a:avLst/>
-              </a:prstGeom>
-              <a:noFill/>
-            </p:spPr>
-            <p:txBody>
-              <a:bodyPr wrap="square">
-                <a:spAutoFit/>
-              </a:bodyPr>
-              <a:lstStyle/>
-              <a:p>
-                <a:pPr/>
-                <a14:m>
-                  <m:oMathPara xmlns:m="http://schemas.openxmlformats.org/officeDocument/2006/math">
-                    <m:oMathParaPr>
-                      <m:jc m:val="centerGroup"/>
-                    </m:oMathParaPr>
-                    <m:oMath xmlns:m="http://schemas.openxmlformats.org/officeDocument/2006/math">
-                      <m:sSub>
-                        <m:sSubPr>
-                          <m:ctrlPr>
-                            <a:rPr lang="en-US" altLang="zh-CN" sz="2400" i="1" dirty="0">
-                              <a:latin typeface="Cambria Math" panose="02040503050406030204" pitchFamily="18" charset="0"/>
-                              <a:cs typeface="Times New Roman" panose="02020603050405020304" pitchFamily="18" charset="0"/>
-                            </a:rPr>
-                          </m:ctrlPr>
-                        </m:sSubPr>
-                        <m:e>
-                          <m:r>
-                            <a:rPr lang="en-US" altLang="zh-CN" sz="2400" dirty="0">
-                              <a:latin typeface="Cambria Math" panose="02040503050406030204" pitchFamily="18" charset="0"/>
-                              <a:cs typeface="Times New Roman" panose="02020603050405020304" pitchFamily="18" charset="0"/>
-                            </a:rPr>
-                            <m:t>𝑟</m:t>
-                          </m:r>
-                        </m:e>
-                        <m:sub>
-                          <m:r>
-                            <a:rPr lang="en-US" altLang="zh-CN" sz="2400" dirty="0">
-                              <a:latin typeface="Cambria Math" panose="02040503050406030204" pitchFamily="18" charset="0"/>
-                              <a:cs typeface="Times New Roman" panose="02020603050405020304" pitchFamily="18" charset="0"/>
-                            </a:rPr>
-                            <m:t>𝑥𝑦</m:t>
-                          </m:r>
-                        </m:sub>
-                      </m:sSub>
-                      <m:d>
-                        <m:dPr>
-                          <m:ctrlPr>
-                            <a:rPr lang="en-US" altLang="zh-CN" sz="2400" i="1" dirty="0">
-                              <a:latin typeface="Cambria Math" panose="02040503050406030204" pitchFamily="18" charset="0"/>
-                              <a:cs typeface="Times New Roman" panose="02020603050405020304" pitchFamily="18" charset="0"/>
-                            </a:rPr>
-                          </m:ctrlPr>
-                        </m:dPr>
-                        <m:e>
-                          <m:r>
-                            <a:rPr lang="en-US" altLang="zh-CN" sz="2400" dirty="0">
-                              <a:latin typeface="Cambria Math" panose="02040503050406030204" pitchFamily="18" charset="0"/>
-                              <a:cs typeface="Times New Roman" panose="02020603050405020304" pitchFamily="18" charset="0"/>
-                            </a:rPr>
-                            <m:t>𝑘</m:t>
-                          </m:r>
-                        </m:e>
-                      </m:d>
-                      <m:r>
-                        <a:rPr lang="en-US" altLang="zh-CN" sz="2400" dirty="0">
-                          <a:latin typeface="Cambria Math" panose="02040503050406030204" pitchFamily="18" charset="0"/>
-                          <a:cs typeface="Times New Roman" panose="02020603050405020304" pitchFamily="18" charset="0"/>
-                        </a:rPr>
-                        <m:t>=</m:t>
-                      </m:r>
-                      <m:r>
-                        <a:rPr lang="zh-CN" altLang="en-US" sz="2400" dirty="0">
-                          <a:latin typeface="Cambria Math" panose="02040503050406030204" pitchFamily="18" charset="0"/>
-                          <a:cs typeface="Times New Roman" panose="02020603050405020304" pitchFamily="18" charset="0"/>
-                        </a:rPr>
-                        <m:t>𝔼</m:t>
-                      </m:r>
-                      <m:d>
-                        <m:dPr>
-                          <m:begChr m:val="["/>
-                          <m:endChr m:val="]"/>
-                          <m:ctrlPr>
-                            <a:rPr lang="en-US" altLang="zh-CN" sz="2400" i="1" dirty="0">
-                              <a:latin typeface="Cambria Math" panose="02040503050406030204" pitchFamily="18" charset="0"/>
-                              <a:cs typeface="Times New Roman" panose="02020603050405020304" pitchFamily="18" charset="0"/>
-                            </a:rPr>
-                          </m:ctrlPr>
-                        </m:dPr>
-                        <m:e>
-                          <m:r>
-                            <a:rPr lang="en-US" altLang="zh-CN" sz="2400" dirty="0">
-                              <a:latin typeface="Cambria Math" panose="02040503050406030204" pitchFamily="18" charset="0"/>
-                              <a:cs typeface="Times New Roman" panose="02020603050405020304" pitchFamily="18" charset="0"/>
-                            </a:rPr>
-                            <m:t>𝑥</m:t>
-                          </m:r>
-                          <m:d>
-                            <m:dPr>
-                              <m:ctrlPr>
-                                <a:rPr lang="en-US" altLang="zh-CN" sz="2400" i="1" dirty="0">
-                                  <a:latin typeface="Cambria Math" panose="02040503050406030204" pitchFamily="18" charset="0"/>
-                                  <a:cs typeface="Times New Roman" panose="02020603050405020304" pitchFamily="18" charset="0"/>
-                                </a:rPr>
-                              </m:ctrlPr>
-                            </m:dPr>
-                            <m:e>
-                              <m:r>
-                                <a:rPr lang="en-US" altLang="zh-CN" sz="2400" dirty="0">
-                                  <a:latin typeface="Cambria Math" panose="02040503050406030204" pitchFamily="18" charset="0"/>
-                                  <a:cs typeface="Times New Roman" panose="02020603050405020304" pitchFamily="18" charset="0"/>
-                                </a:rPr>
-                                <m:t>𝑛</m:t>
-                              </m:r>
-                            </m:e>
-                          </m:d>
-                          <m:r>
-                            <a:rPr lang="en-US" altLang="zh-CN" sz="2400" dirty="0">
-                              <a:latin typeface="Cambria Math" panose="02040503050406030204" pitchFamily="18" charset="0"/>
-                              <a:cs typeface="Times New Roman" panose="02020603050405020304" pitchFamily="18" charset="0"/>
-                            </a:rPr>
-                            <m:t>𝑦</m:t>
-                          </m:r>
-                          <m:d>
-                            <m:dPr>
-                              <m:ctrlPr>
-                                <a:rPr lang="en-US" altLang="zh-CN" sz="2400" i="1" dirty="0">
-                                  <a:latin typeface="Cambria Math" panose="02040503050406030204" pitchFamily="18" charset="0"/>
-                                  <a:cs typeface="Times New Roman" panose="02020603050405020304" pitchFamily="18" charset="0"/>
-                                </a:rPr>
-                              </m:ctrlPr>
-                            </m:dPr>
-                            <m:e>
-                              <m:r>
-                                <a:rPr lang="en-US" altLang="zh-CN" sz="2400" dirty="0">
-                                  <a:latin typeface="Cambria Math" panose="02040503050406030204" pitchFamily="18" charset="0"/>
-                                  <a:cs typeface="Times New Roman" panose="02020603050405020304" pitchFamily="18" charset="0"/>
-                                </a:rPr>
-                                <m:t>𝑛</m:t>
-                              </m:r>
-                              <m:r>
-                                <a:rPr lang="en-US" altLang="zh-CN" sz="2400" dirty="0">
-                                  <a:latin typeface="Cambria Math" panose="02040503050406030204" pitchFamily="18" charset="0"/>
-                                  <a:cs typeface="Times New Roman" panose="02020603050405020304" pitchFamily="18" charset="0"/>
-                                </a:rPr>
-                                <m:t>−</m:t>
-                              </m:r>
-                              <m:r>
-                                <a:rPr lang="en-US" altLang="zh-CN" sz="2400" dirty="0">
-                                  <a:latin typeface="Cambria Math" panose="02040503050406030204" pitchFamily="18" charset="0"/>
-                                  <a:cs typeface="Times New Roman" panose="02020603050405020304" pitchFamily="18" charset="0"/>
-                                </a:rPr>
-                                <m:t>𝑘</m:t>
-                              </m:r>
-                            </m:e>
-                          </m:d>
-                        </m:e>
-                      </m:d>
-                      <m:r>
-                        <a:rPr lang="en-US" altLang="zh-CN" sz="2400" dirty="0">
-                          <a:latin typeface="Cambria Math" panose="02040503050406030204" pitchFamily="18" charset="0"/>
-                          <a:cs typeface="Times New Roman" panose="02020603050405020304" pitchFamily="18" charset="0"/>
-                        </a:rPr>
-                        <m:t>=</m:t>
-                      </m:r>
-                      <m:r>
-                        <a:rPr lang="zh-CN" altLang="en-US" sz="2400" dirty="0">
-                          <a:latin typeface="Cambria Math" panose="02040503050406030204" pitchFamily="18" charset="0"/>
-                          <a:cs typeface="Times New Roman" panose="02020603050405020304" pitchFamily="18" charset="0"/>
-                        </a:rPr>
-                        <m:t>𝔼</m:t>
-                      </m:r>
-                      <m:d>
-                        <m:dPr>
-                          <m:begChr m:val="["/>
-                          <m:endChr m:val="]"/>
-                          <m:ctrlPr>
-                            <a:rPr lang="en-US" altLang="zh-CN" sz="2400" i="1" dirty="0">
-                              <a:latin typeface="Cambria Math" panose="02040503050406030204" pitchFamily="18" charset="0"/>
-                              <a:cs typeface="Times New Roman" panose="02020603050405020304" pitchFamily="18" charset="0"/>
-                            </a:rPr>
-                          </m:ctrlPr>
-                        </m:dPr>
-                        <m:e>
-                          <m:r>
-                            <a:rPr lang="en-US" altLang="zh-CN" sz="2400" dirty="0">
-                              <a:latin typeface="Cambria Math" panose="02040503050406030204" pitchFamily="18" charset="0"/>
-                              <a:cs typeface="Times New Roman" panose="02020603050405020304" pitchFamily="18" charset="0"/>
-                            </a:rPr>
-                            <m:t>𝑥</m:t>
-                          </m:r>
-                          <m:d>
-                            <m:dPr>
-                              <m:ctrlPr>
-                                <a:rPr lang="en-US" altLang="zh-CN" sz="2400" i="1" dirty="0">
-                                  <a:latin typeface="Cambria Math" panose="02040503050406030204" pitchFamily="18" charset="0"/>
-                                  <a:cs typeface="Times New Roman" panose="02020603050405020304" pitchFamily="18" charset="0"/>
-                                </a:rPr>
-                              </m:ctrlPr>
-                            </m:dPr>
-                            <m:e>
-                              <m:r>
-                                <a:rPr lang="en-US" altLang="zh-CN" sz="2400" dirty="0">
-                                  <a:latin typeface="Cambria Math" panose="02040503050406030204" pitchFamily="18" charset="0"/>
-                                  <a:cs typeface="Times New Roman" panose="02020603050405020304" pitchFamily="18" charset="0"/>
-                                </a:rPr>
-                                <m:t>𝑛</m:t>
-                              </m:r>
-                            </m:e>
-                          </m:d>
-                          <m:d>
-                            <m:dPr>
-                              <m:begChr m:val="{"/>
-                              <m:endChr m:val="}"/>
-                              <m:ctrlPr>
-                                <a:rPr lang="en-US" altLang="zh-CN" sz="2400" i="1" dirty="0">
-                                  <a:latin typeface="Cambria Math" panose="02040503050406030204" pitchFamily="18" charset="0"/>
-                                  <a:cs typeface="Times New Roman" panose="02020603050405020304" pitchFamily="18" charset="0"/>
-                                </a:rPr>
-                              </m:ctrlPr>
-                            </m:dPr>
-                            <m:e>
-                              <m:r>
-                                <a:rPr lang="en-US" altLang="zh-CN" sz="2400" dirty="0">
-                                  <a:latin typeface="Cambria Math" panose="02040503050406030204" pitchFamily="18" charset="0"/>
-                                  <a:cs typeface="Times New Roman" panose="02020603050405020304" pitchFamily="18" charset="0"/>
-                                </a:rPr>
-                                <m:t>𝑥</m:t>
-                              </m:r>
-                              <m:d>
-                                <m:dPr>
-                                  <m:ctrlPr>
-                                    <a:rPr lang="en-US" altLang="zh-CN" sz="2400" i="1" dirty="0">
-                                      <a:latin typeface="Cambria Math" panose="02040503050406030204" pitchFamily="18" charset="0"/>
-                                      <a:cs typeface="Times New Roman" panose="02020603050405020304" pitchFamily="18" charset="0"/>
-                                    </a:rPr>
-                                  </m:ctrlPr>
-                                </m:dPr>
-                                <m:e>
-                                  <m:r>
-                                    <a:rPr lang="en-US" altLang="zh-CN" sz="2400" dirty="0">
-                                      <a:latin typeface="Cambria Math" panose="02040503050406030204" pitchFamily="18" charset="0"/>
-                                      <a:cs typeface="Times New Roman" panose="02020603050405020304" pitchFamily="18" charset="0"/>
-                                    </a:rPr>
-                                    <m:t>𝑛</m:t>
-                                  </m:r>
-                                  <m:r>
-                                    <a:rPr lang="en-US" altLang="zh-CN" sz="2400" dirty="0">
-                                      <a:latin typeface="Cambria Math" panose="02040503050406030204" pitchFamily="18" charset="0"/>
-                                      <a:cs typeface="Times New Roman" panose="02020603050405020304" pitchFamily="18" charset="0"/>
-                                    </a:rPr>
-                                    <m:t>−</m:t>
-                                  </m:r>
-                                  <m:r>
-                                    <a:rPr lang="en-US" altLang="zh-CN" sz="2400" dirty="0">
-                                      <a:latin typeface="Cambria Math" panose="02040503050406030204" pitchFamily="18" charset="0"/>
-                                      <a:cs typeface="Times New Roman" panose="02020603050405020304" pitchFamily="18" charset="0"/>
-                                    </a:rPr>
-                                    <m:t>𝑘</m:t>
-                                  </m:r>
-                                </m:e>
-                              </m:d>
-                              <m:r>
-                                <a:rPr lang="en-US" altLang="zh-CN" sz="2400" dirty="0">
-                                  <a:latin typeface="Cambria Math" panose="02040503050406030204" pitchFamily="18" charset="0"/>
-                                  <a:cs typeface="Times New Roman" panose="02020603050405020304" pitchFamily="18" charset="0"/>
-                                </a:rPr>
-                                <m:t>+</m:t>
-                              </m:r>
-                              <m:r>
-                                <a:rPr lang="en-US" altLang="zh-CN" sz="2400" dirty="0">
-                                  <a:latin typeface="Cambria Math" panose="02040503050406030204" pitchFamily="18" charset="0"/>
-                                  <a:cs typeface="Times New Roman" panose="02020603050405020304" pitchFamily="18" charset="0"/>
-                                </a:rPr>
-                                <m:t>𝑣</m:t>
-                              </m:r>
-                              <m:d>
-                                <m:dPr>
-                                  <m:ctrlPr>
-                                    <a:rPr lang="en-US" altLang="zh-CN" sz="2400" i="1" dirty="0">
-                                      <a:latin typeface="Cambria Math" panose="02040503050406030204" pitchFamily="18" charset="0"/>
-                                      <a:cs typeface="Times New Roman" panose="02020603050405020304" pitchFamily="18" charset="0"/>
-                                    </a:rPr>
-                                  </m:ctrlPr>
-                                </m:dPr>
-                                <m:e>
-                                  <m:r>
-                                    <a:rPr lang="en-US" altLang="zh-CN" sz="2400" dirty="0">
-                                      <a:latin typeface="Cambria Math" panose="02040503050406030204" pitchFamily="18" charset="0"/>
-                                      <a:cs typeface="Times New Roman" panose="02020603050405020304" pitchFamily="18" charset="0"/>
-                                    </a:rPr>
-                                    <m:t>𝑛</m:t>
-                                  </m:r>
-                                  <m:r>
-                                    <a:rPr lang="en-US" altLang="zh-CN" sz="2400" dirty="0">
-                                      <a:latin typeface="Cambria Math" panose="02040503050406030204" pitchFamily="18" charset="0"/>
-                                      <a:cs typeface="Times New Roman" panose="02020603050405020304" pitchFamily="18" charset="0"/>
-                                    </a:rPr>
-                                    <m:t>−</m:t>
-                                  </m:r>
-                                  <m:r>
-                                    <a:rPr lang="en-US" altLang="zh-CN" sz="2400" dirty="0">
-                                      <a:latin typeface="Cambria Math" panose="02040503050406030204" pitchFamily="18" charset="0"/>
-                                      <a:cs typeface="Times New Roman" panose="02020603050405020304" pitchFamily="18" charset="0"/>
-                                    </a:rPr>
-                                    <m:t>𝑘</m:t>
-                                  </m:r>
-                                </m:e>
-                              </m:d>
-                            </m:e>
-                          </m:d>
-                        </m:e>
-                      </m:d>
-                    </m:oMath>
-                  </m:oMathPara>
-                </a14:m>
-                <a:endParaRPr lang="en-US" altLang="zh-CN" sz="2400" dirty="0">
-                  <a:latin typeface="CMU Serif" panose="02000603000000000000" pitchFamily="2" charset="0"/>
-                  <a:ea typeface="CMU Serif" panose="02000603000000000000" pitchFamily="2" charset="0"/>
-                  <a:cs typeface="CMU Serif" panose="02000603000000000000" pitchFamily="2" charset="0"/>
-                </a:endParaRPr>
-              </a:p>
-              <a:p>
+                <a:pPr marL="342900" indent="-342900">
+                  <a:buFont typeface="Arial" panose="020B0604020202020204" pitchFamily="34" charset="0"/>
+                  <a:buChar char="•"/>
+                </a:pPr>
                 <a:r>
                   <a:rPr lang="en-US" altLang="zh-CN" sz="2400" dirty="0">
-                    <a:latin typeface="CMU Serif" panose="02000603000000000000" pitchFamily="2" charset="0"/>
-                    <a:ea typeface="CMU Serif" panose="02000603000000000000" pitchFamily="2" charset="0"/>
-                    <a:cs typeface="CMU Serif" panose="02000603000000000000" pitchFamily="2" charset="0"/>
+                    <a:cs typeface="Times New Roman" panose="02020603050405020304" pitchFamily="18" charset="0"/>
                   </a:rPr>
-                  <a:t>	 </a:t>
+                  <a:t>	</a:t>
                 </a:r>
-                <a14:m>
-                  <m:oMath xmlns:m="http://schemas.openxmlformats.org/officeDocument/2006/math">
-                    <m:r>
-                      <a:rPr lang="en-US" altLang="zh-CN" sz="2400" dirty="0">
-                        <a:latin typeface="Cambria Math" panose="02040503050406030204" pitchFamily="18" charset="0"/>
-                        <a:cs typeface="Times New Roman" panose="02020603050405020304" pitchFamily="18" charset="0"/>
-                      </a:rPr>
-                      <m:t>=</m:t>
-                    </m:r>
-                    <m:r>
-                      <a:rPr lang="zh-CN" altLang="en-US" sz="2400" dirty="0">
-                        <a:latin typeface="Cambria Math" panose="02040503050406030204" pitchFamily="18" charset="0"/>
-                        <a:cs typeface="Times New Roman" panose="02020603050405020304" pitchFamily="18" charset="0"/>
-                      </a:rPr>
-                      <m:t>𝔼</m:t>
-                    </m:r>
-                    <m:d>
-                      <m:dPr>
-                        <m:begChr m:val="["/>
-                        <m:endChr m:val="]"/>
-                        <m:ctrlPr>
-                          <a:rPr lang="en-US" altLang="zh-CN" sz="2400" i="1" dirty="0">
-                            <a:latin typeface="Cambria Math" panose="02040503050406030204" pitchFamily="18" charset="0"/>
-                            <a:cs typeface="Times New Roman" panose="02020603050405020304" pitchFamily="18" charset="0"/>
-                          </a:rPr>
-                        </m:ctrlPr>
-                      </m:dPr>
-                      <m:e>
-                        <m:r>
-                          <a:rPr lang="en-US" altLang="zh-CN" sz="2400" dirty="0">
-                            <a:latin typeface="Cambria Math" panose="02040503050406030204" pitchFamily="18" charset="0"/>
-                            <a:cs typeface="Times New Roman" panose="02020603050405020304" pitchFamily="18" charset="0"/>
-                          </a:rPr>
-                          <m:t>𝑥</m:t>
-                        </m:r>
-                        <m:d>
-                          <m:dPr>
-                            <m:ctrlPr>
-                              <a:rPr lang="en-US" altLang="zh-CN" sz="2400" i="1" dirty="0">
-                                <a:latin typeface="Cambria Math" panose="02040503050406030204" pitchFamily="18" charset="0"/>
-                                <a:cs typeface="Times New Roman" panose="02020603050405020304" pitchFamily="18" charset="0"/>
-                              </a:rPr>
-                            </m:ctrlPr>
-                          </m:dPr>
-                          <m:e>
-                            <m:r>
-                              <a:rPr lang="en-US" altLang="zh-CN" sz="2400" dirty="0">
-                                <a:latin typeface="Cambria Math" panose="02040503050406030204" pitchFamily="18" charset="0"/>
-                                <a:cs typeface="Times New Roman" panose="02020603050405020304" pitchFamily="18" charset="0"/>
-                              </a:rPr>
-                              <m:t>𝑛</m:t>
-                            </m:r>
-                          </m:e>
-                        </m:d>
-                        <m:r>
-                          <a:rPr lang="en-US" altLang="zh-CN" sz="2400" dirty="0">
-                            <a:latin typeface="Cambria Math" panose="02040503050406030204" pitchFamily="18" charset="0"/>
-                            <a:cs typeface="Times New Roman" panose="02020603050405020304" pitchFamily="18" charset="0"/>
-                          </a:rPr>
-                          <m:t>𝑥</m:t>
-                        </m:r>
-                        <m:d>
-                          <m:dPr>
-                            <m:ctrlPr>
-                              <a:rPr lang="en-US" altLang="zh-CN" sz="2400" i="1" dirty="0">
-                                <a:latin typeface="Cambria Math" panose="02040503050406030204" pitchFamily="18" charset="0"/>
-                                <a:cs typeface="Times New Roman" panose="02020603050405020304" pitchFamily="18" charset="0"/>
-                              </a:rPr>
-                            </m:ctrlPr>
-                          </m:dPr>
-                          <m:e>
-                            <m:r>
-                              <a:rPr lang="en-US" altLang="zh-CN" sz="2400" dirty="0">
-                                <a:latin typeface="Cambria Math" panose="02040503050406030204" pitchFamily="18" charset="0"/>
-                                <a:cs typeface="Times New Roman" panose="02020603050405020304" pitchFamily="18" charset="0"/>
-                              </a:rPr>
-                              <m:t>𝑛</m:t>
-                            </m:r>
-                            <m:r>
-                              <a:rPr lang="en-US" altLang="zh-CN" sz="2400" dirty="0">
-                                <a:latin typeface="Cambria Math" panose="02040503050406030204" pitchFamily="18" charset="0"/>
-                                <a:cs typeface="Times New Roman" panose="02020603050405020304" pitchFamily="18" charset="0"/>
-                              </a:rPr>
-                              <m:t>−</m:t>
-                            </m:r>
-                            <m:r>
-                              <a:rPr lang="en-US" altLang="zh-CN" sz="2400" dirty="0">
-                                <a:latin typeface="Cambria Math" panose="02040503050406030204" pitchFamily="18" charset="0"/>
-                                <a:cs typeface="Times New Roman" panose="02020603050405020304" pitchFamily="18" charset="0"/>
-                              </a:rPr>
-                              <m:t>𝑘</m:t>
-                            </m:r>
-                          </m:e>
-                        </m:d>
-                      </m:e>
-                    </m:d>
-                    <m:r>
-                      <a:rPr lang="en-US" altLang="zh-CN" sz="2400" dirty="0">
-                        <a:latin typeface="Cambria Math" panose="02040503050406030204" pitchFamily="18" charset="0"/>
-                        <a:cs typeface="Times New Roman" panose="02020603050405020304" pitchFamily="18" charset="0"/>
-                      </a:rPr>
-                      <m:t>=</m:t>
-                    </m:r>
-                    <m:sSub>
-                      <m:sSubPr>
-                        <m:ctrlPr>
-                          <a:rPr lang="en-US" altLang="zh-CN" sz="2400" i="1" dirty="0">
-                            <a:latin typeface="Cambria Math" panose="02040503050406030204" pitchFamily="18" charset="0"/>
-                            <a:cs typeface="Times New Roman" panose="02020603050405020304" pitchFamily="18" charset="0"/>
-                          </a:rPr>
-                        </m:ctrlPr>
-                      </m:sSubPr>
-                      <m:e>
-                        <m:r>
-                          <a:rPr lang="en-US" altLang="zh-CN" sz="2400" dirty="0">
-                            <a:latin typeface="Cambria Math" panose="02040503050406030204" pitchFamily="18" charset="0"/>
-                            <a:cs typeface="Times New Roman" panose="02020603050405020304" pitchFamily="18" charset="0"/>
-                          </a:rPr>
-                          <m:t>𝑟</m:t>
-                        </m:r>
-                      </m:e>
-                      <m:sub>
-                        <m:r>
-                          <a:rPr lang="en-US" altLang="zh-CN" sz="2400" dirty="0">
-                            <a:latin typeface="Cambria Math" panose="02040503050406030204" pitchFamily="18" charset="0"/>
-                            <a:cs typeface="Times New Roman" panose="02020603050405020304" pitchFamily="18" charset="0"/>
-                          </a:rPr>
-                          <m:t>𝑥𝑥</m:t>
-                        </m:r>
-                      </m:sub>
-                    </m:sSub>
-                    <m:d>
-                      <m:dPr>
-                        <m:ctrlPr>
-                          <a:rPr lang="en-US" altLang="zh-CN" sz="2400" i="1" dirty="0">
-                            <a:latin typeface="Cambria Math" panose="02040503050406030204" pitchFamily="18" charset="0"/>
-                            <a:cs typeface="Times New Roman" panose="02020603050405020304" pitchFamily="18" charset="0"/>
-                          </a:rPr>
-                        </m:ctrlPr>
-                      </m:dPr>
-                      <m:e>
-                        <m:r>
-                          <a:rPr lang="en-US" altLang="zh-CN" sz="2400" dirty="0">
-                            <a:latin typeface="Cambria Math" panose="02040503050406030204" pitchFamily="18" charset="0"/>
-                            <a:cs typeface="Times New Roman" panose="02020603050405020304" pitchFamily="18" charset="0"/>
-                          </a:rPr>
-                          <m:t>𝑘</m:t>
-                        </m:r>
-                      </m:e>
-                    </m:d>
-                  </m:oMath>
-                </a14:m>
-                <a:endParaRPr lang="zh-CN" altLang="en-US" sz="2400" dirty="0">
-                  <a:latin typeface="CMU Serif" panose="02000603000000000000" pitchFamily="2" charset="0"/>
-                  <a:cs typeface="CMU Serif" panose="02000603000000000000" pitchFamily="2" charset="0"/>
-                </a:endParaRPr>
-              </a:p>
-            </p:txBody>
-          </p:sp>
-        </mc:Choice>
-        <mc:Fallback xmlns="">
-          <p:sp>
-            <p:nvSpPr>
-              <p:cNvPr id="7" name="文本框 6">
-                <a:extLst>
-                  <a:ext uri="{FF2B5EF4-FFF2-40B4-BE49-F238E27FC236}">
-                    <a16:creationId xmlns:a16="http://schemas.microsoft.com/office/drawing/2014/main" id="{7CF32BBB-2439-9E67-BD4B-EC6E81BA3129}"/>
-                  </a:ext>
-                </a:extLst>
-              </p:cNvPr>
-              <p:cNvSpPr txBox="1">
-                <a:spLocks noRot="1" noChangeAspect="1" noMove="1" noResize="1" noEditPoints="1" noAdjustHandles="1" noChangeArrowheads="1" noChangeShapeType="1" noTextEdit="1"/>
-              </p:cNvSpPr>
-              <p:nvPr/>
-            </p:nvSpPr>
-            <p:spPr>
-              <a:xfrm>
-                <a:off x="2356433" y="2569380"/>
-                <a:ext cx="8080961" cy="864789"/>
-              </a:xfrm>
-              <a:prstGeom prst="rect">
-                <a:avLst/>
-              </a:prstGeom>
-              <a:blipFill>
-                <a:blip r:embed="rId3"/>
-                <a:stretch>
-                  <a:fillRect/>
-                </a:stretch>
-              </a:blipFill>
-            </p:spPr>
-            <p:txBody>
-              <a:bodyPr/>
-              <a:lstStyle/>
-              <a:p>
-                <a:r>
-                  <a:rPr lang="zh-CN" altLang="en-US">
-                    <a:noFill/>
-                  </a:rPr>
-                  <a:t> </a:t>
-                </a:r>
-              </a:p>
-            </p:txBody>
-          </p:sp>
-        </mc:Fallback>
-      </mc:AlternateContent>
-      <mc:AlternateContent xmlns:mc="http://schemas.openxmlformats.org/markup-compatibility/2006" xmlns:a14="http://schemas.microsoft.com/office/drawing/2010/main">
-        <mc:Choice Requires="a14">
-          <p:sp>
-            <p:nvSpPr>
-              <p:cNvPr id="8" name="文本框 7">
-                <a:extLst>
-                  <a:ext uri="{FF2B5EF4-FFF2-40B4-BE49-F238E27FC236}">
-                    <a16:creationId xmlns:a16="http://schemas.microsoft.com/office/drawing/2014/main" id="{B8E7DF8C-021E-C0CE-469F-E6DE3E1D3B59}"/>
-                  </a:ext>
-                </a:extLst>
-              </p:cNvPr>
-              <p:cNvSpPr txBox="1"/>
-              <p:nvPr/>
-            </p:nvSpPr>
-            <p:spPr>
-              <a:xfrm>
-                <a:off x="2411954" y="4619226"/>
-                <a:ext cx="6097002" cy="490840"/>
-              </a:xfrm>
-              <a:prstGeom prst="rect">
-                <a:avLst/>
-              </a:prstGeom>
-              <a:noFill/>
-            </p:spPr>
-            <p:txBody>
-              <a:bodyPr wrap="square">
-                <a:spAutoFit/>
-              </a:bodyPr>
-              <a:lstStyle/>
-              <a:p>
-                <a:r>
-                  <a:rPr lang="en-US" altLang="zh-CN" sz="2400" dirty="0">
-                    <a:latin typeface="CMU Serif" panose="02000603000000000000" pitchFamily="2" charset="0"/>
-                    <a:ea typeface="CMU Serif" panose="02000603000000000000" pitchFamily="2" charset="0"/>
-                    <a:cs typeface="CMU Serif" panose="02000603000000000000" pitchFamily="2" charset="0"/>
-                  </a:rPr>
-                  <a:t>Hence, we can compute </a:t>
-                </a:r>
-                <a14:m>
-                  <m:oMath xmlns:m="http://schemas.openxmlformats.org/officeDocument/2006/math">
-                    <m:sSub>
-                      <m:sSubPr>
-                        <m:ctrlPr>
-                          <a:rPr lang="en-US" altLang="zh-CN" sz="2400" i="1" dirty="0" smtClean="0">
-                            <a:latin typeface="Cambria Math" panose="02040503050406030204" pitchFamily="18" charset="0"/>
-                            <a:cs typeface="Times New Roman" panose="02020603050405020304" pitchFamily="18" charset="0"/>
-                          </a:rPr>
-                        </m:ctrlPr>
-                      </m:sSubPr>
-                      <m:e>
-                        <m:r>
-                          <a:rPr lang="en-US" altLang="zh-CN" sz="2400" dirty="0">
-                            <a:latin typeface="Cambria Math" panose="02040503050406030204" pitchFamily="18" charset="0"/>
-                            <a:cs typeface="Times New Roman" panose="02020603050405020304" pitchFamily="18" charset="0"/>
-                          </a:rPr>
-                          <m:t>𝑟</m:t>
-                        </m:r>
-                      </m:e>
-                      <m:sub>
-                        <m:r>
-                          <a:rPr lang="en-US" altLang="zh-CN" sz="2400" dirty="0">
-                            <a:latin typeface="Cambria Math" panose="02040503050406030204" pitchFamily="18" charset="0"/>
-                            <a:cs typeface="Times New Roman" panose="02020603050405020304" pitchFamily="18" charset="0"/>
-                          </a:rPr>
-                          <m:t>𝑥𝑦</m:t>
-                        </m:r>
-                      </m:sub>
-                    </m:sSub>
-                    <m:d>
-                      <m:dPr>
-                        <m:ctrlPr>
-                          <a:rPr lang="en-US" altLang="zh-CN" sz="2400" i="1" dirty="0">
-                            <a:latin typeface="Cambria Math" panose="02040503050406030204" pitchFamily="18" charset="0"/>
-                            <a:cs typeface="Times New Roman" panose="02020603050405020304" pitchFamily="18" charset="0"/>
-                          </a:rPr>
-                        </m:ctrlPr>
-                      </m:dPr>
-                      <m:e>
-                        <m:r>
-                          <a:rPr lang="en-US" altLang="zh-CN" sz="2400" dirty="0">
-                            <a:latin typeface="Cambria Math" panose="02040503050406030204" pitchFamily="18" charset="0"/>
-                            <a:cs typeface="Times New Roman" panose="02020603050405020304" pitchFamily="18" charset="0"/>
-                          </a:rPr>
-                          <m:t>𝑘</m:t>
-                        </m:r>
-                      </m:e>
-                    </m:d>
-                  </m:oMath>
-                </a14:m>
-                <a:r>
-                  <a:rPr lang="en-US" altLang="zh-CN" sz="2400" dirty="0">
-                    <a:latin typeface="CMU Serif" panose="02000603000000000000" pitchFamily="2" charset="0"/>
-                    <a:ea typeface="CMU Serif" panose="02000603000000000000" pitchFamily="2" charset="0"/>
-                    <a:cs typeface="CMU Serif" panose="02000603000000000000" pitchFamily="2" charset="0"/>
-                  </a:rPr>
-                  <a:t> via</a:t>
-                </a:r>
-              </a:p>
-            </p:txBody>
-          </p:sp>
-        </mc:Choice>
-        <mc:Fallback xmlns="">
-          <p:sp>
-            <p:nvSpPr>
-              <p:cNvPr id="8" name="文本框 7">
-                <a:extLst>
-                  <a:ext uri="{FF2B5EF4-FFF2-40B4-BE49-F238E27FC236}">
-                    <a16:creationId xmlns:a16="http://schemas.microsoft.com/office/drawing/2014/main" id="{B8E7DF8C-021E-C0CE-469F-E6DE3E1D3B59}"/>
-                  </a:ext>
-                </a:extLst>
-              </p:cNvPr>
-              <p:cNvSpPr txBox="1">
-                <a:spLocks noRot="1" noChangeAspect="1" noMove="1" noResize="1" noEditPoints="1" noAdjustHandles="1" noChangeArrowheads="1" noChangeShapeType="1" noTextEdit="1"/>
-              </p:cNvSpPr>
-              <p:nvPr/>
-            </p:nvSpPr>
-            <p:spPr>
-              <a:xfrm>
-                <a:off x="2411954" y="4619226"/>
-                <a:ext cx="6097002" cy="490840"/>
-              </a:xfrm>
-              <a:prstGeom prst="rect">
-                <a:avLst/>
-              </a:prstGeom>
-              <a:blipFill>
-                <a:blip r:embed="rId4"/>
-                <a:stretch>
-                  <a:fillRect l="-1600" t="-3750" b="-28750"/>
-                </a:stretch>
-              </a:blipFill>
-            </p:spPr>
-            <p:txBody>
-              <a:bodyPr/>
-              <a:lstStyle/>
-              <a:p>
-                <a:r>
-                  <a:rPr lang="zh-CN" altLang="en-US">
-                    <a:noFill/>
-                  </a:rPr>
-                  <a:t> </a:t>
-                </a:r>
-              </a:p>
-            </p:txBody>
-          </p:sp>
-        </mc:Fallback>
-      </mc:AlternateContent>
-      <mc:AlternateContent xmlns:mc="http://schemas.openxmlformats.org/markup-compatibility/2006" xmlns:a14="http://schemas.microsoft.com/office/drawing/2010/main">
-        <mc:Choice Requires="a14">
-          <p:sp>
-            <p:nvSpPr>
-              <p:cNvPr id="10" name="文本框 9">
-                <a:extLst>
-                  <a:ext uri="{FF2B5EF4-FFF2-40B4-BE49-F238E27FC236}">
-                    <a16:creationId xmlns:a16="http://schemas.microsoft.com/office/drawing/2014/main" id="{03AC9A21-5593-EE34-2B31-05EB3D260709}"/>
-                  </a:ext>
-                </a:extLst>
-              </p:cNvPr>
-              <p:cNvSpPr txBox="1"/>
-              <p:nvPr/>
-            </p:nvSpPr>
-            <p:spPr>
-              <a:xfrm>
-                <a:off x="2455193" y="2078339"/>
-                <a:ext cx="7281610" cy="461665"/>
-              </a:xfrm>
-              <a:prstGeom prst="rect">
-                <a:avLst/>
-              </a:prstGeom>
-              <a:noFill/>
-            </p:spPr>
-            <p:txBody>
-              <a:bodyPr wrap="square">
-                <a:spAutoFit/>
-              </a:bodyPr>
-              <a:lstStyle/>
-              <a:p>
                 <a14:m>
                   <m:oMath xmlns:m="http://schemas.openxmlformats.org/officeDocument/2006/math">
                     <m:sSub>
@@ -27320,367 +26726,170 @@
                   </a:rPr>
                   <a:t>directly computable</a:t>
                 </a:r>
-                <a:endParaRPr lang="zh-CN" altLang="en-US" sz="2400" dirty="0">
-                  <a:latin typeface="CMU Serif" panose="02000603000000000000" pitchFamily="2" charset="0"/>
-                  <a:cs typeface="CMU Serif" panose="02000603000000000000" pitchFamily="2" charset="0"/>
-                </a:endParaRPr>
               </a:p>
-            </p:txBody>
-          </p:sp>
-        </mc:Choice>
-        <mc:Fallback xmlns="">
-          <p:sp>
-            <p:nvSpPr>
-              <p:cNvPr id="10" name="文本框 9">
-                <a:extLst>
-                  <a:ext uri="{FF2B5EF4-FFF2-40B4-BE49-F238E27FC236}">
-                    <a16:creationId xmlns:a16="http://schemas.microsoft.com/office/drawing/2014/main" id="{03AC9A21-5593-EE34-2B31-05EB3D260709}"/>
-                  </a:ext>
-                </a:extLst>
-              </p:cNvPr>
-              <p:cNvSpPr txBox="1">
-                <a:spLocks noRot="1" noChangeAspect="1" noMove="1" noResize="1" noEditPoints="1" noAdjustHandles="1" noChangeArrowheads="1" noChangeShapeType="1" noTextEdit="1"/>
-              </p:cNvSpPr>
-              <p:nvPr/>
-            </p:nvSpPr>
-            <p:spPr>
-              <a:xfrm>
-                <a:off x="2455193" y="2078339"/>
-                <a:ext cx="7281610" cy="461665"/>
-              </a:xfrm>
-              <a:prstGeom prst="rect">
-                <a:avLst/>
-              </a:prstGeom>
-              <a:blipFill>
-                <a:blip r:embed="rId5"/>
-                <a:stretch>
-                  <a:fillRect t="-9211" b="-30263"/>
-                </a:stretch>
-              </a:blipFill>
-            </p:spPr>
-            <p:txBody>
-              <a:bodyPr/>
-              <a:lstStyle/>
-              <a:p>
-                <a:r>
-                  <a:rPr lang="zh-CN" altLang="en-US">
-                    <a:noFill/>
-                  </a:rPr>
-                  <a:t> </a:t>
-                </a:r>
-              </a:p>
-            </p:txBody>
-          </p:sp>
-        </mc:Fallback>
-      </mc:AlternateContent>
-      <mc:AlternateContent xmlns:mc="http://schemas.openxmlformats.org/markup-compatibility/2006" xmlns:a14="http://schemas.microsoft.com/office/drawing/2010/main">
-        <mc:Choice Requires="a14">
-          <p:sp>
-            <p:nvSpPr>
-              <p:cNvPr id="12" name="文本框 11">
-                <a:extLst>
-                  <a:ext uri="{FF2B5EF4-FFF2-40B4-BE49-F238E27FC236}">
-                    <a16:creationId xmlns:a16="http://schemas.microsoft.com/office/drawing/2014/main" id="{F940915E-710B-8C95-BA2B-0CC49737BEC6}"/>
-                  </a:ext>
-                </a:extLst>
-              </p:cNvPr>
-              <p:cNvSpPr txBox="1"/>
-              <p:nvPr/>
-            </p:nvSpPr>
-            <p:spPr>
-              <a:xfrm>
-                <a:off x="1994737" y="3754437"/>
-                <a:ext cx="7281609" cy="864789"/>
-              </a:xfrm>
-              <a:prstGeom prst="rect">
-                <a:avLst/>
-              </a:prstGeom>
-              <a:noFill/>
-            </p:spPr>
-            <p:txBody>
-              <a:bodyPr wrap="square">
-                <a:spAutoFit/>
-              </a:bodyPr>
-              <a:lstStyle/>
               <a:p>
                 <a:pPr/>
-                <a14:m>
-                  <m:oMathPara xmlns:m="http://schemas.openxmlformats.org/officeDocument/2006/math">
-                    <m:oMathParaPr>
-                      <m:jc m:val="centerGroup"/>
-                    </m:oMathParaPr>
-                    <m:oMath xmlns:m="http://schemas.openxmlformats.org/officeDocument/2006/math">
-                      <m:sSub>
-                        <m:sSubPr>
-                          <m:ctrlPr>
-                            <a:rPr lang="en-US" altLang="zh-CN" sz="2400" i="1" dirty="0">
-                              <a:latin typeface="Cambria Math" panose="02040503050406030204" pitchFamily="18" charset="0"/>
-                              <a:cs typeface="Times New Roman" panose="02020603050405020304" pitchFamily="18" charset="0"/>
-                            </a:rPr>
-                          </m:ctrlPr>
-                        </m:sSubPr>
-                        <m:e>
-                          <m:r>
-                            <a:rPr lang="en-US" altLang="zh-CN" sz="2400" dirty="0">
-                              <a:latin typeface="Cambria Math" panose="02040503050406030204" pitchFamily="18" charset="0"/>
-                              <a:cs typeface="Times New Roman" panose="02020603050405020304" pitchFamily="18" charset="0"/>
-                            </a:rPr>
-                            <m:t>𝑟</m:t>
-                          </m:r>
-                        </m:e>
-                        <m:sub>
-                          <m:r>
-                            <a:rPr lang="en-US" altLang="zh-CN" sz="2400" dirty="0">
-                              <a:latin typeface="Cambria Math" panose="02040503050406030204" pitchFamily="18" charset="0"/>
-                              <a:cs typeface="Times New Roman" panose="02020603050405020304" pitchFamily="18" charset="0"/>
-                            </a:rPr>
-                            <m:t>𝑦𝑦</m:t>
-                          </m:r>
-                        </m:sub>
-                      </m:sSub>
-                      <m:d>
-                        <m:dPr>
-                          <m:ctrlPr>
-                            <a:rPr lang="en-US" altLang="zh-CN" sz="2400" i="1" dirty="0">
-                              <a:latin typeface="Cambria Math" panose="02040503050406030204" pitchFamily="18" charset="0"/>
-                              <a:cs typeface="Times New Roman" panose="02020603050405020304" pitchFamily="18" charset="0"/>
-                            </a:rPr>
-                          </m:ctrlPr>
-                        </m:dPr>
-                        <m:e>
-                          <m:r>
-                            <a:rPr lang="en-US" altLang="zh-CN" sz="2400" dirty="0">
-                              <a:latin typeface="Cambria Math" panose="02040503050406030204" pitchFamily="18" charset="0"/>
-                              <a:cs typeface="Times New Roman" panose="02020603050405020304" pitchFamily="18" charset="0"/>
-                            </a:rPr>
-                            <m:t>𝑘</m:t>
-                          </m:r>
-                        </m:e>
-                      </m:d>
-                      <m:r>
-                        <a:rPr lang="en-US" altLang="zh-CN" sz="2400" dirty="0">
-                          <a:latin typeface="Cambria Math" panose="02040503050406030204" pitchFamily="18" charset="0"/>
-                          <a:cs typeface="Times New Roman" panose="02020603050405020304" pitchFamily="18" charset="0"/>
-                        </a:rPr>
-                        <m:t>=</m:t>
-                      </m:r>
-                      <m:r>
-                        <a:rPr lang="zh-CN" altLang="en-US" sz="2400" dirty="0">
-                          <a:latin typeface="Cambria Math" panose="02040503050406030204" pitchFamily="18" charset="0"/>
-                          <a:cs typeface="Times New Roman" panose="02020603050405020304" pitchFamily="18" charset="0"/>
-                        </a:rPr>
-                        <m:t>𝔼</m:t>
-                      </m:r>
-                      <m:d>
-                        <m:dPr>
-                          <m:begChr m:val="["/>
-                          <m:endChr m:val="]"/>
-                          <m:ctrlPr>
-                            <a:rPr lang="en-US" altLang="zh-CN" sz="2400" i="1" dirty="0">
-                              <a:latin typeface="Cambria Math" panose="02040503050406030204" pitchFamily="18" charset="0"/>
-                              <a:cs typeface="Times New Roman" panose="02020603050405020304" pitchFamily="18" charset="0"/>
-                            </a:rPr>
-                          </m:ctrlPr>
-                        </m:dPr>
-                        <m:e>
-                          <m:d>
-                            <m:dPr>
-                              <m:begChr m:val="{"/>
-                              <m:endChr m:val="}"/>
-                              <m:ctrlPr>
-                                <a:rPr lang="en-US" altLang="zh-CN" sz="2400" i="1" dirty="0">
-                                  <a:latin typeface="Cambria Math" panose="02040503050406030204" pitchFamily="18" charset="0"/>
-                                  <a:cs typeface="Times New Roman" panose="02020603050405020304" pitchFamily="18" charset="0"/>
-                                </a:rPr>
-                              </m:ctrlPr>
-                            </m:dPr>
-                            <m:e>
-                              <m:r>
-                                <a:rPr lang="en-US" altLang="zh-CN" sz="2400" dirty="0">
-                                  <a:latin typeface="Cambria Math" panose="02040503050406030204" pitchFamily="18" charset="0"/>
-                                  <a:cs typeface="Times New Roman" panose="02020603050405020304" pitchFamily="18" charset="0"/>
-                                </a:rPr>
-                                <m:t>𝑥</m:t>
-                              </m:r>
-                              <m:d>
-                                <m:dPr>
-                                  <m:ctrlPr>
-                                    <a:rPr lang="en-US" altLang="zh-CN" sz="2400" i="1" dirty="0">
-                                      <a:latin typeface="Cambria Math" panose="02040503050406030204" pitchFamily="18" charset="0"/>
-                                      <a:cs typeface="Times New Roman" panose="02020603050405020304" pitchFamily="18" charset="0"/>
-                                    </a:rPr>
-                                  </m:ctrlPr>
-                                </m:dPr>
-                                <m:e>
-                                  <m:r>
-                                    <a:rPr lang="en-US" altLang="zh-CN" sz="2400" dirty="0">
-                                      <a:latin typeface="Cambria Math" panose="02040503050406030204" pitchFamily="18" charset="0"/>
-                                      <a:cs typeface="Times New Roman" panose="02020603050405020304" pitchFamily="18" charset="0"/>
-                                    </a:rPr>
-                                    <m:t>𝑛</m:t>
-                                  </m:r>
-                                </m:e>
-                              </m:d>
-                              <m:r>
-                                <a:rPr lang="en-US" altLang="zh-CN" sz="2400" dirty="0">
-                                  <a:latin typeface="Cambria Math" panose="02040503050406030204" pitchFamily="18" charset="0"/>
-                                  <a:cs typeface="Times New Roman" panose="02020603050405020304" pitchFamily="18" charset="0"/>
-                                </a:rPr>
-                                <m:t>+</m:t>
-                              </m:r>
-                              <m:r>
-                                <a:rPr lang="en-US" altLang="zh-CN" sz="2400" dirty="0">
-                                  <a:latin typeface="Cambria Math" panose="02040503050406030204" pitchFamily="18" charset="0"/>
-                                  <a:cs typeface="Times New Roman" panose="02020603050405020304" pitchFamily="18" charset="0"/>
-                                </a:rPr>
-                                <m:t>𝑣</m:t>
-                              </m:r>
-                              <m:d>
-                                <m:dPr>
-                                  <m:ctrlPr>
-                                    <a:rPr lang="en-US" altLang="zh-CN" sz="2400" i="1" dirty="0">
-                                      <a:latin typeface="Cambria Math" panose="02040503050406030204" pitchFamily="18" charset="0"/>
-                                      <a:cs typeface="Times New Roman" panose="02020603050405020304" pitchFamily="18" charset="0"/>
-                                    </a:rPr>
-                                  </m:ctrlPr>
-                                </m:dPr>
-                                <m:e>
-                                  <m:r>
-                                    <a:rPr lang="en-US" altLang="zh-CN" sz="2400" dirty="0">
-                                      <a:latin typeface="Cambria Math" panose="02040503050406030204" pitchFamily="18" charset="0"/>
-                                      <a:cs typeface="Times New Roman" panose="02020603050405020304" pitchFamily="18" charset="0"/>
-                                    </a:rPr>
-                                    <m:t>𝑛</m:t>
-                                  </m:r>
-                                </m:e>
-                              </m:d>
-                            </m:e>
-                          </m:d>
-                          <m:d>
-                            <m:dPr>
-                              <m:begChr m:val="{"/>
-                              <m:endChr m:val="}"/>
-                              <m:ctrlPr>
-                                <a:rPr lang="en-US" altLang="zh-CN" sz="2400" i="1" dirty="0">
-                                  <a:latin typeface="Cambria Math" panose="02040503050406030204" pitchFamily="18" charset="0"/>
-                                  <a:cs typeface="Times New Roman" panose="02020603050405020304" pitchFamily="18" charset="0"/>
-                                </a:rPr>
-                              </m:ctrlPr>
-                            </m:dPr>
-                            <m:e>
-                              <m:r>
-                                <a:rPr lang="en-US" altLang="zh-CN" sz="2400" dirty="0">
-                                  <a:latin typeface="Cambria Math" panose="02040503050406030204" pitchFamily="18" charset="0"/>
-                                  <a:cs typeface="Times New Roman" panose="02020603050405020304" pitchFamily="18" charset="0"/>
-                                </a:rPr>
-                                <m:t>𝑥</m:t>
-                              </m:r>
-                              <m:d>
-                                <m:dPr>
-                                  <m:ctrlPr>
-                                    <a:rPr lang="en-US" altLang="zh-CN" sz="2400" i="1" dirty="0">
-                                      <a:latin typeface="Cambria Math" panose="02040503050406030204" pitchFamily="18" charset="0"/>
-                                      <a:cs typeface="Times New Roman" panose="02020603050405020304" pitchFamily="18" charset="0"/>
-                                    </a:rPr>
-                                  </m:ctrlPr>
-                                </m:dPr>
-                                <m:e>
-                                  <m:r>
-                                    <a:rPr lang="en-US" altLang="zh-CN" sz="2400" dirty="0">
-                                      <a:latin typeface="Cambria Math" panose="02040503050406030204" pitchFamily="18" charset="0"/>
-                                      <a:cs typeface="Times New Roman" panose="02020603050405020304" pitchFamily="18" charset="0"/>
-                                    </a:rPr>
-                                    <m:t>𝑛</m:t>
-                                  </m:r>
-                                  <m:r>
-                                    <a:rPr lang="en-US" altLang="zh-CN" sz="2400" dirty="0">
-                                      <a:latin typeface="Cambria Math" panose="02040503050406030204" pitchFamily="18" charset="0"/>
-                                      <a:cs typeface="Times New Roman" panose="02020603050405020304" pitchFamily="18" charset="0"/>
-                                    </a:rPr>
-                                    <m:t>−</m:t>
-                                  </m:r>
-                                  <m:r>
-                                    <a:rPr lang="en-US" altLang="zh-CN" sz="2400" dirty="0">
-                                      <a:latin typeface="Cambria Math" panose="02040503050406030204" pitchFamily="18" charset="0"/>
-                                      <a:cs typeface="Times New Roman" panose="02020603050405020304" pitchFamily="18" charset="0"/>
-                                    </a:rPr>
-                                    <m:t>𝑘</m:t>
-                                  </m:r>
-                                </m:e>
-                              </m:d>
-                              <m:r>
-                                <a:rPr lang="en-US" altLang="zh-CN" sz="2400" dirty="0">
-                                  <a:latin typeface="Cambria Math" panose="02040503050406030204" pitchFamily="18" charset="0"/>
-                                  <a:cs typeface="Times New Roman" panose="02020603050405020304" pitchFamily="18" charset="0"/>
-                                </a:rPr>
-                                <m:t>+</m:t>
-                              </m:r>
-                              <m:r>
-                                <a:rPr lang="en-US" altLang="zh-CN" sz="2400" dirty="0">
-                                  <a:latin typeface="Cambria Math" panose="02040503050406030204" pitchFamily="18" charset="0"/>
-                                  <a:cs typeface="Times New Roman" panose="02020603050405020304" pitchFamily="18" charset="0"/>
-                                </a:rPr>
-                                <m:t>𝑣</m:t>
-                              </m:r>
-                              <m:d>
-                                <m:dPr>
-                                  <m:ctrlPr>
-                                    <a:rPr lang="en-US" altLang="zh-CN" sz="2400" i="1" dirty="0">
-                                      <a:latin typeface="Cambria Math" panose="02040503050406030204" pitchFamily="18" charset="0"/>
-                                      <a:cs typeface="Times New Roman" panose="02020603050405020304" pitchFamily="18" charset="0"/>
-                                    </a:rPr>
-                                  </m:ctrlPr>
-                                </m:dPr>
-                                <m:e>
-                                  <m:r>
-                                    <a:rPr lang="en-US" altLang="zh-CN" sz="2400" dirty="0">
-                                      <a:latin typeface="Cambria Math" panose="02040503050406030204" pitchFamily="18" charset="0"/>
-                                      <a:cs typeface="Times New Roman" panose="02020603050405020304" pitchFamily="18" charset="0"/>
-                                    </a:rPr>
-                                    <m:t>𝑛</m:t>
-                                  </m:r>
-                                  <m:r>
-                                    <a:rPr lang="en-US" altLang="zh-CN" sz="2400" dirty="0">
-                                      <a:latin typeface="Cambria Math" panose="02040503050406030204" pitchFamily="18" charset="0"/>
-                                      <a:cs typeface="Times New Roman" panose="02020603050405020304" pitchFamily="18" charset="0"/>
-                                    </a:rPr>
-                                    <m:t>−</m:t>
-                                  </m:r>
-                                  <m:r>
-                                    <a:rPr lang="en-US" altLang="zh-CN" sz="2400" dirty="0">
-                                      <a:latin typeface="Cambria Math" panose="02040503050406030204" pitchFamily="18" charset="0"/>
-                                      <a:cs typeface="Times New Roman" panose="02020603050405020304" pitchFamily="18" charset="0"/>
-                                    </a:rPr>
-                                    <m:t>𝑘</m:t>
-                                  </m:r>
-                                </m:e>
-                              </m:d>
-                            </m:e>
-                          </m:d>
-                        </m:e>
-                      </m:d>
-                    </m:oMath>
-                  </m:oMathPara>
-                </a14:m>
-                <a:endParaRPr lang="en-US" altLang="zh-CN" sz="2400" dirty="0">
-                  <a:latin typeface="CMU Serif" panose="02000603000000000000" pitchFamily="2" charset="0"/>
-                  <a:ea typeface="CMU Serif" panose="02000603000000000000" pitchFamily="2" charset="0"/>
-                  <a:cs typeface="CMU Serif" panose="02000603000000000000" pitchFamily="2" charset="0"/>
+                <a:endParaRPr lang="en-US" altLang="zh-CN" sz="2400" i="1" dirty="0">
+                  <a:latin typeface="Cambria Math" panose="02040503050406030204" pitchFamily="18" charset="0"/>
+                  <a:cs typeface="Times New Roman" panose="02020603050405020304" pitchFamily="18" charset="0"/>
                 </a:endParaRPr>
               </a:p>
               <a:p>
+                <a:pPr marL="342900" indent="-342900">
+                  <a:buFont typeface="Arial" panose="020B0604020202020204" pitchFamily="34" charset="0"/>
+                  <a:buChar char="•"/>
+                </a:pPr>
                 <a:r>
                   <a:rPr lang="en-US" altLang="zh-CN" sz="2400" dirty="0">
-                    <a:latin typeface="CMU Serif" panose="02000603000000000000" pitchFamily="2" charset="0"/>
-                    <a:ea typeface="CMU Serif" panose="02000603000000000000" pitchFamily="2" charset="0"/>
-                    <a:cs typeface="CMU Serif" panose="02000603000000000000" pitchFamily="2" charset="0"/>
+                    <a:cs typeface="Times New Roman" panose="02020603050405020304" pitchFamily="18" charset="0"/>
                   </a:rPr>
-                  <a:t>	     </a:t>
+                  <a:t>	</a:t>
                 </a:r>
                 <a14:m>
                   <m:oMath xmlns:m="http://schemas.openxmlformats.org/officeDocument/2006/math">
+                    <m:sSub>
+                      <m:sSubPr>
+                        <m:ctrlPr>
+                          <a:rPr lang="en-US" altLang="zh-CN" sz="2400" b="1" i="1" dirty="0" smtClean="0">
+                            <a:latin typeface="Cambria Math" panose="02040503050406030204" pitchFamily="18" charset="0"/>
+                            <a:cs typeface="Times New Roman" panose="02020603050405020304" pitchFamily="18" charset="0"/>
+                          </a:rPr>
+                        </m:ctrlPr>
+                      </m:sSubPr>
+                      <m:e>
+                        <m:r>
+                          <a:rPr lang="en-US" altLang="zh-CN" sz="2400" b="1" i="1" dirty="0">
+                            <a:latin typeface="Cambria Math" panose="02040503050406030204" pitchFamily="18" charset="0"/>
+                            <a:cs typeface="Times New Roman" panose="02020603050405020304" pitchFamily="18" charset="0"/>
+                          </a:rPr>
+                          <m:t>𝒓</m:t>
+                        </m:r>
+                      </m:e>
+                      <m:sub>
+                        <m:r>
+                          <a:rPr lang="en-US" altLang="zh-CN" sz="2400" b="1" i="1" dirty="0">
+                            <a:latin typeface="Cambria Math" panose="02040503050406030204" pitchFamily="18" charset="0"/>
+                            <a:cs typeface="Times New Roman" panose="02020603050405020304" pitchFamily="18" charset="0"/>
+                          </a:rPr>
+                          <m:t>𝒙𝒚</m:t>
+                        </m:r>
+                      </m:sub>
+                    </m:sSub>
+                    <m:d>
+                      <m:dPr>
+                        <m:ctrlPr>
+                          <a:rPr lang="en-US" altLang="zh-CN" sz="2400" b="1" i="1" dirty="0">
+                            <a:latin typeface="Cambria Math" panose="02040503050406030204" pitchFamily="18" charset="0"/>
+                            <a:cs typeface="Times New Roman" panose="02020603050405020304" pitchFamily="18" charset="0"/>
+                          </a:rPr>
+                        </m:ctrlPr>
+                      </m:dPr>
+                      <m:e>
+                        <m:r>
+                          <a:rPr lang="en-US" altLang="zh-CN" sz="2400" b="1" i="1" dirty="0">
+                            <a:latin typeface="Cambria Math" panose="02040503050406030204" pitchFamily="18" charset="0"/>
+                            <a:cs typeface="Times New Roman" panose="02020603050405020304" pitchFamily="18" charset="0"/>
+                          </a:rPr>
+                          <m:t>𝒌</m:t>
+                        </m:r>
+                      </m:e>
+                    </m:d>
                     <m:r>
-                      <a:rPr lang="en-US" altLang="zh-CN" sz="2400">
+                      <a:rPr lang="en-US" altLang="zh-CN" sz="2400" dirty="0">
+                        <a:latin typeface="Cambria Math" panose="02040503050406030204" pitchFamily="18" charset="0"/>
+                        <a:cs typeface="Times New Roman" panose="02020603050405020304" pitchFamily="18" charset="0"/>
+                      </a:rPr>
+                      <m:t>=</m:t>
+                    </m:r>
+                    <m:r>
+                      <a:rPr lang="zh-CN" altLang="en-US" sz="2400" dirty="0">
+                        <a:latin typeface="Cambria Math" panose="02040503050406030204" pitchFamily="18" charset="0"/>
+                        <a:cs typeface="Times New Roman" panose="02020603050405020304" pitchFamily="18" charset="0"/>
+                      </a:rPr>
+                      <m:t>𝔼</m:t>
+                    </m:r>
+                    <m:d>
+                      <m:dPr>
+                        <m:begChr m:val="["/>
+                        <m:endChr m:val="]"/>
+                        <m:ctrlPr>
+                          <a:rPr lang="en-US" altLang="zh-CN" sz="2400" i="1" dirty="0">
+                            <a:latin typeface="Cambria Math" panose="02040503050406030204" pitchFamily="18" charset="0"/>
+                            <a:cs typeface="Times New Roman" panose="02020603050405020304" pitchFamily="18" charset="0"/>
+                          </a:rPr>
+                        </m:ctrlPr>
+                      </m:dPr>
+                      <m:e>
+                        <m:r>
+                          <a:rPr lang="en-US" altLang="zh-CN" sz="2400" dirty="0">
+                            <a:latin typeface="Cambria Math" panose="02040503050406030204" pitchFamily="18" charset="0"/>
+                            <a:cs typeface="Times New Roman" panose="02020603050405020304" pitchFamily="18" charset="0"/>
+                          </a:rPr>
+                          <m:t>𝑥</m:t>
+                        </m:r>
+                        <m:d>
+                          <m:dPr>
+                            <m:ctrlPr>
+                              <a:rPr lang="en-US" altLang="zh-CN" sz="2400" i="1" dirty="0">
+                                <a:latin typeface="Cambria Math" panose="02040503050406030204" pitchFamily="18" charset="0"/>
+                                <a:cs typeface="Times New Roman" panose="02020603050405020304" pitchFamily="18" charset="0"/>
+                              </a:rPr>
+                            </m:ctrlPr>
+                          </m:dPr>
+                          <m:e>
+                            <m:r>
+                              <a:rPr lang="en-US" altLang="zh-CN" sz="2400" dirty="0">
+                                <a:latin typeface="Cambria Math" panose="02040503050406030204" pitchFamily="18" charset="0"/>
+                                <a:cs typeface="Times New Roman" panose="02020603050405020304" pitchFamily="18" charset="0"/>
+                              </a:rPr>
+                              <m:t>𝑛</m:t>
+                            </m:r>
+                          </m:e>
+                        </m:d>
+                        <m:r>
+                          <a:rPr lang="en-US" altLang="zh-CN" sz="2400" dirty="0">
+                            <a:latin typeface="Cambria Math" panose="02040503050406030204" pitchFamily="18" charset="0"/>
+                            <a:cs typeface="Times New Roman" panose="02020603050405020304" pitchFamily="18" charset="0"/>
+                          </a:rPr>
+                          <m:t>𝑦</m:t>
+                        </m:r>
+                        <m:d>
+                          <m:dPr>
+                            <m:ctrlPr>
+                              <a:rPr lang="en-US" altLang="zh-CN" sz="2400" i="1" dirty="0">
+                                <a:latin typeface="Cambria Math" panose="02040503050406030204" pitchFamily="18" charset="0"/>
+                                <a:cs typeface="Times New Roman" panose="02020603050405020304" pitchFamily="18" charset="0"/>
+                              </a:rPr>
+                            </m:ctrlPr>
+                          </m:dPr>
+                          <m:e>
+                            <m:r>
+                              <a:rPr lang="en-US" altLang="zh-CN" sz="2400" dirty="0">
+                                <a:latin typeface="Cambria Math" panose="02040503050406030204" pitchFamily="18" charset="0"/>
+                                <a:cs typeface="Times New Roman" panose="02020603050405020304" pitchFamily="18" charset="0"/>
+                              </a:rPr>
+                              <m:t>𝑛</m:t>
+                            </m:r>
+                            <m:r>
+                              <a:rPr lang="en-US" altLang="zh-CN" sz="2400" dirty="0">
+                                <a:latin typeface="Cambria Math" panose="02040503050406030204" pitchFamily="18" charset="0"/>
+                                <a:cs typeface="Times New Roman" panose="02020603050405020304" pitchFamily="18" charset="0"/>
+                              </a:rPr>
+                              <m:t>−</m:t>
+                            </m:r>
+                            <m:r>
+                              <a:rPr lang="en-US" altLang="zh-CN" sz="2400" dirty="0">
+                                <a:latin typeface="Cambria Math" panose="02040503050406030204" pitchFamily="18" charset="0"/>
+                                <a:cs typeface="Times New Roman" panose="02020603050405020304" pitchFamily="18" charset="0"/>
+                              </a:rPr>
+                              <m:t>𝑘</m:t>
+                            </m:r>
+                          </m:e>
+                        </m:d>
+                      </m:e>
+                    </m:d>
+                    <m:r>
+                      <a:rPr lang="en-US" altLang="zh-CN" sz="2400" b="0" i="1" dirty="0" smtClean="0">
                         <a:latin typeface="Cambria Math" panose="02040503050406030204" pitchFamily="18" charset="0"/>
                         <a:cs typeface="Times New Roman" panose="02020603050405020304" pitchFamily="18" charset="0"/>
                       </a:rPr>
@@ -27734,11 +26943,65 @@
                       </m:e>
                     </m:d>
                     <m:r>
+                      <a:rPr lang="en-US" altLang="zh-CN" sz="2400" b="0" i="0" dirty="0" smtClean="0">
+                        <a:latin typeface="Cambria Math" panose="02040503050406030204" pitchFamily="18" charset="0"/>
+                        <a:cs typeface="Times New Roman" panose="02020603050405020304" pitchFamily="18" charset="0"/>
+                      </a:rPr>
+                      <m:t>=</m:t>
+                    </m:r>
+                    <m:sSub>
+                      <m:sSubPr>
+                        <m:ctrlPr>
+                          <a:rPr lang="en-US" altLang="zh-CN" sz="2400" i="1" dirty="0">
+                            <a:latin typeface="Cambria Math" panose="02040503050406030204" pitchFamily="18" charset="0"/>
+                            <a:cs typeface="Times New Roman" panose="02020603050405020304" pitchFamily="18" charset="0"/>
+                          </a:rPr>
+                        </m:ctrlPr>
+                      </m:sSubPr>
+                      <m:e>
+                        <m:r>
+                          <a:rPr lang="en-US" altLang="zh-CN" sz="2400" dirty="0">
+                            <a:latin typeface="Cambria Math" panose="02040503050406030204" pitchFamily="18" charset="0"/>
+                            <a:cs typeface="Times New Roman" panose="02020603050405020304" pitchFamily="18" charset="0"/>
+                          </a:rPr>
+                          <m:t>𝑟</m:t>
+                        </m:r>
+                      </m:e>
+                      <m:sub>
+                        <m:r>
+                          <a:rPr lang="en-US" altLang="zh-CN" sz="2400" dirty="0">
+                            <a:latin typeface="Cambria Math" panose="02040503050406030204" pitchFamily="18" charset="0"/>
+                            <a:cs typeface="Times New Roman" panose="02020603050405020304" pitchFamily="18" charset="0"/>
+                          </a:rPr>
+                          <m:t>𝑦𝑦</m:t>
+                        </m:r>
+                      </m:sub>
+                    </m:sSub>
+                    <m:d>
+                      <m:dPr>
+                        <m:ctrlPr>
+                          <a:rPr lang="en-US" altLang="zh-CN" sz="2400" i="1" dirty="0">
+                            <a:latin typeface="Cambria Math" panose="02040503050406030204" pitchFamily="18" charset="0"/>
+                            <a:cs typeface="Times New Roman" panose="02020603050405020304" pitchFamily="18" charset="0"/>
+                          </a:rPr>
+                        </m:ctrlPr>
+                      </m:dPr>
+                      <m:e>
+                        <m:r>
+                          <a:rPr lang="en-US" altLang="zh-CN" sz="2400" dirty="0">
+                            <a:latin typeface="Cambria Math" panose="02040503050406030204" pitchFamily="18" charset="0"/>
+                            <a:cs typeface="Times New Roman" panose="02020603050405020304" pitchFamily="18" charset="0"/>
+                          </a:rPr>
+                          <m:t>𝑘</m:t>
+                        </m:r>
+                      </m:e>
+                    </m:d>
+                    <m:r>
                       <a:rPr lang="en-US" altLang="zh-CN" sz="2400" dirty="0">
                         <a:latin typeface="Cambria Math" panose="02040503050406030204" pitchFamily="18" charset="0"/>
                         <a:cs typeface="Times New Roman" panose="02020603050405020304" pitchFamily="18" charset="0"/>
                       </a:rPr>
-                      <m:t>+</m:t>
+                      <m:t>−</m:t>
                     </m:r>
                     <m:sSub>
                       <m:sSubPr>
@@ -27789,22 +27052,21 @@
                     </m:d>
                   </m:oMath>
                 </a14:m>
-                <a:endParaRPr lang="en-US" altLang="zh-CN" sz="2400" dirty="0">
+                <a:endParaRPr lang="zh-CN" altLang="en-US" sz="2400" dirty="0">
                   <a:latin typeface="CMU Serif" panose="02000603000000000000" pitchFamily="2" charset="0"/>
-                  <a:ea typeface="CMU Serif" panose="02000603000000000000" pitchFamily="2" charset="0"/>
                   <a:cs typeface="CMU Serif" panose="02000603000000000000" pitchFamily="2" charset="0"/>
                 </a:endParaRPr>
               </a:p>
             </p:txBody>
           </p:sp>
         </mc:Choice>
-        <mc:Fallback xmlns="">
+        <mc:Fallback>
           <p:sp>
             <p:nvSpPr>
-              <p:cNvPr id="12" name="文本框 11">
+              <p:cNvPr id="7" name="文本框 6">
                 <a:extLst>
                   <a:ext uri="{FF2B5EF4-FFF2-40B4-BE49-F238E27FC236}">
-                    <a16:creationId xmlns:a16="http://schemas.microsoft.com/office/drawing/2014/main" id="{F940915E-710B-8C95-BA2B-0CC49737BEC6}"/>
+                    <a16:creationId xmlns:a16="http://schemas.microsoft.com/office/drawing/2014/main" id="{7CF32BBB-2439-9E67-BD4B-EC6E81BA3129}"/>
                   </a:ext>
                 </a:extLst>
               </p:cNvPr>
@@ -27815,361 +27077,16 @@
             </p:nvSpPr>
             <p:spPr>
               <a:xfrm>
-                <a:off x="1994737" y="3754437"/>
-                <a:ext cx="7281609" cy="864789"/>
+                <a:off x="1403684" y="3077760"/>
+                <a:ext cx="9384631" cy="1997342"/>
               </a:xfrm>
               <a:prstGeom prst="rect">
                 <a:avLst/>
               </a:prstGeom>
               <a:blipFill>
-                <a:blip r:embed="rId6"/>
+                <a:blip r:embed="rId2"/>
                 <a:stretch>
-                  <a:fillRect/>
-                </a:stretch>
-              </a:blipFill>
-            </p:spPr>
-            <p:txBody>
-              <a:bodyPr/>
-              <a:lstStyle/>
-              <a:p>
-                <a:r>
-                  <a:rPr lang="zh-CN" altLang="en-US">
-                    <a:noFill/>
-                  </a:rPr>
-                  <a:t> </a:t>
-                </a:r>
-              </a:p>
-            </p:txBody>
-          </p:sp>
-        </mc:Fallback>
-      </mc:AlternateContent>
-      <p:sp>
-        <p:nvSpPr>
-          <p:cNvPr id="14" name="文本框 13">
-            <a:extLst>
-              <a:ext uri="{FF2B5EF4-FFF2-40B4-BE49-F238E27FC236}">
-                <a16:creationId xmlns:a16="http://schemas.microsoft.com/office/drawing/2014/main" id="{49D68F80-AECE-7DE4-6255-23DC4733A144}"/>
-              </a:ext>
-            </a:extLst>
-          </p:cNvPr>
-          <p:cNvSpPr txBox="1"/>
-          <p:nvPr/>
-        </p:nvSpPr>
-        <p:spPr>
-          <a:xfrm>
-            <a:off x="2411954" y="3363471"/>
-            <a:ext cx="1915527" cy="461665"/>
-          </a:xfrm>
-          <a:prstGeom prst="rect">
-            <a:avLst/>
-          </a:prstGeom>
-        </p:spPr>
-        <p:txBody>
-          <a:bodyPr wrap="square">
-            <a:spAutoFit/>
-          </a:bodyPr>
-          <a:lstStyle/>
-          <a:p>
-            <a:r>
-              <a:rPr lang="en-US" altLang="zh-CN" sz="2400" dirty="0">
-                <a:latin typeface="CMU Serif" panose="02000603000000000000" pitchFamily="2" charset="0"/>
-                <a:ea typeface="CMU Serif" panose="02000603000000000000" pitchFamily="2" charset="0"/>
-                <a:cs typeface="CMU Serif" panose="02000603000000000000" pitchFamily="2" charset="0"/>
-              </a:rPr>
-              <a:t>Moreover,</a:t>
-            </a:r>
-            <a:endParaRPr lang="zh-CN" altLang="en-US" sz="2400" dirty="0">
-              <a:latin typeface="CMU Serif" panose="02000603000000000000" pitchFamily="2" charset="0"/>
-              <a:ea typeface="CMU Serif" panose="02000603000000000000" pitchFamily="2" charset="0"/>
-              <a:cs typeface="CMU Serif" panose="02000603000000000000" pitchFamily="2" charset="0"/>
-            </a:endParaRPr>
-          </a:p>
-        </p:txBody>
-      </p:sp>
-      <mc:AlternateContent xmlns:mc="http://schemas.openxmlformats.org/markup-compatibility/2006" xmlns:a14="http://schemas.microsoft.com/office/drawing/2010/main">
-        <mc:Choice Requires="a14">
-          <p:sp>
-            <p:nvSpPr>
-              <p:cNvPr id="16" name="文本框 15">
-                <a:extLst>
-                  <a:ext uri="{FF2B5EF4-FFF2-40B4-BE49-F238E27FC236}">
-                    <a16:creationId xmlns:a16="http://schemas.microsoft.com/office/drawing/2014/main" id="{0DC5694C-4D0C-59C2-BC43-7BCCEACC6F3E}"/>
-                  </a:ext>
-                </a:extLst>
-              </p:cNvPr>
-              <p:cNvSpPr txBox="1"/>
-              <p:nvPr/>
-            </p:nvSpPr>
-            <p:spPr>
-              <a:xfrm>
-                <a:off x="1646823" y="5056155"/>
-                <a:ext cx="6097002" cy="495457"/>
-              </a:xfrm>
-              <a:prstGeom prst="rect">
-                <a:avLst/>
-              </a:prstGeom>
-              <a:noFill/>
-            </p:spPr>
-            <p:txBody>
-              <a:bodyPr wrap="square">
-                <a:spAutoFit/>
-              </a:bodyPr>
-              <a:lstStyle/>
-              <a:p>
-                <a:pPr/>
-                <a14:m>
-                  <m:oMathPara xmlns:m="http://schemas.openxmlformats.org/officeDocument/2006/math">
-                    <m:oMathParaPr>
-                      <m:jc m:val="centerGroup"/>
-                    </m:oMathParaPr>
-                    <m:oMath xmlns:m="http://schemas.openxmlformats.org/officeDocument/2006/math">
-                      <m:sSub>
-                        <m:sSubPr>
-                          <m:ctrlPr>
-                            <a:rPr lang="en-US" altLang="zh-CN" sz="2400" i="1" dirty="0">
-                              <a:latin typeface="Cambria Math" panose="02040503050406030204" pitchFamily="18" charset="0"/>
-                              <a:cs typeface="Times New Roman" panose="02020603050405020304" pitchFamily="18" charset="0"/>
-                            </a:rPr>
-                          </m:ctrlPr>
-                        </m:sSubPr>
-                        <m:e>
-                          <m:r>
-                            <a:rPr lang="en-US" altLang="zh-CN" sz="2400" dirty="0">
-                              <a:latin typeface="Cambria Math" panose="02040503050406030204" pitchFamily="18" charset="0"/>
-                              <a:cs typeface="Times New Roman" panose="02020603050405020304" pitchFamily="18" charset="0"/>
-                            </a:rPr>
-                            <m:t>𝑟</m:t>
-                          </m:r>
-                        </m:e>
-                        <m:sub>
-                          <m:r>
-                            <a:rPr lang="en-US" altLang="zh-CN" sz="2400" dirty="0">
-                              <a:latin typeface="Cambria Math" panose="02040503050406030204" pitchFamily="18" charset="0"/>
-                              <a:cs typeface="Times New Roman" panose="02020603050405020304" pitchFamily="18" charset="0"/>
-                            </a:rPr>
-                            <m:t>𝑥𝑦</m:t>
-                          </m:r>
-                        </m:sub>
-                      </m:sSub>
-                      <m:d>
-                        <m:dPr>
-                          <m:ctrlPr>
-                            <a:rPr lang="en-US" altLang="zh-CN" sz="2400" i="1" dirty="0">
-                              <a:latin typeface="Cambria Math" panose="02040503050406030204" pitchFamily="18" charset="0"/>
-                              <a:cs typeface="Times New Roman" panose="02020603050405020304" pitchFamily="18" charset="0"/>
-                            </a:rPr>
-                          </m:ctrlPr>
-                        </m:dPr>
-                        <m:e>
-                          <m:r>
-                            <a:rPr lang="en-US" altLang="zh-CN" sz="2400" dirty="0">
-                              <a:latin typeface="Cambria Math" panose="02040503050406030204" pitchFamily="18" charset="0"/>
-                              <a:cs typeface="Times New Roman" panose="02020603050405020304" pitchFamily="18" charset="0"/>
-                            </a:rPr>
-                            <m:t>𝑘</m:t>
-                          </m:r>
-                        </m:e>
-                      </m:d>
-                      <m:r>
-                        <a:rPr lang="en-US" altLang="zh-CN" sz="2400" dirty="0">
-                          <a:latin typeface="Cambria Math" panose="02040503050406030204" pitchFamily="18" charset="0"/>
-                          <a:cs typeface="Times New Roman" panose="02020603050405020304" pitchFamily="18" charset="0"/>
-                        </a:rPr>
-                        <m:t>=</m:t>
-                      </m:r>
-                      <m:sSub>
-                        <m:sSubPr>
-                          <m:ctrlPr>
-                            <a:rPr lang="en-US" altLang="zh-CN" sz="2400" i="1" dirty="0">
-                              <a:latin typeface="Cambria Math" panose="02040503050406030204" pitchFamily="18" charset="0"/>
-                              <a:cs typeface="Times New Roman" panose="02020603050405020304" pitchFamily="18" charset="0"/>
-                            </a:rPr>
-                          </m:ctrlPr>
-                        </m:sSubPr>
-                        <m:e>
-                          <m:r>
-                            <a:rPr lang="en-US" altLang="zh-CN" sz="2400" dirty="0">
-                              <a:latin typeface="Cambria Math" panose="02040503050406030204" pitchFamily="18" charset="0"/>
-                              <a:cs typeface="Times New Roman" panose="02020603050405020304" pitchFamily="18" charset="0"/>
-                            </a:rPr>
-                            <m:t>𝑟</m:t>
-                          </m:r>
-                        </m:e>
-                        <m:sub>
-                          <m:r>
-                            <a:rPr lang="en-US" altLang="zh-CN" sz="2400" dirty="0">
-                              <a:latin typeface="Cambria Math" panose="02040503050406030204" pitchFamily="18" charset="0"/>
-                              <a:cs typeface="Times New Roman" panose="02020603050405020304" pitchFamily="18" charset="0"/>
-                            </a:rPr>
-                            <m:t>𝑥𝑥</m:t>
-                          </m:r>
-                        </m:sub>
-                      </m:sSub>
-                      <m:d>
-                        <m:dPr>
-                          <m:ctrlPr>
-                            <a:rPr lang="en-US" altLang="zh-CN" sz="2400" i="1" dirty="0">
-                              <a:latin typeface="Cambria Math" panose="02040503050406030204" pitchFamily="18" charset="0"/>
-                              <a:cs typeface="Times New Roman" panose="02020603050405020304" pitchFamily="18" charset="0"/>
-                            </a:rPr>
-                          </m:ctrlPr>
-                        </m:dPr>
-                        <m:e>
-                          <m:r>
-                            <a:rPr lang="en-US" altLang="zh-CN" sz="2400" dirty="0">
-                              <a:latin typeface="Cambria Math" panose="02040503050406030204" pitchFamily="18" charset="0"/>
-                              <a:cs typeface="Times New Roman" panose="02020603050405020304" pitchFamily="18" charset="0"/>
-                            </a:rPr>
-                            <m:t>𝑘</m:t>
-                          </m:r>
-                        </m:e>
-                      </m:d>
-                      <m:r>
-                        <a:rPr lang="en-US" altLang="zh-CN" sz="2400" dirty="0">
-                          <a:latin typeface="Cambria Math" panose="02040503050406030204" pitchFamily="18" charset="0"/>
-                          <a:cs typeface="Times New Roman" panose="02020603050405020304" pitchFamily="18" charset="0"/>
-                        </a:rPr>
-                        <m:t>=</m:t>
-                      </m:r>
-                      <m:sSub>
-                        <m:sSubPr>
-                          <m:ctrlPr>
-                            <a:rPr lang="en-US" altLang="zh-CN" sz="2400" i="1" dirty="0">
-                              <a:latin typeface="Cambria Math" panose="02040503050406030204" pitchFamily="18" charset="0"/>
-                              <a:cs typeface="Times New Roman" panose="02020603050405020304" pitchFamily="18" charset="0"/>
-                            </a:rPr>
-                          </m:ctrlPr>
-                        </m:sSubPr>
-                        <m:e>
-                          <m:r>
-                            <a:rPr lang="en-US" altLang="zh-CN" sz="2400" dirty="0">
-                              <a:latin typeface="Cambria Math" panose="02040503050406030204" pitchFamily="18" charset="0"/>
-                              <a:cs typeface="Times New Roman" panose="02020603050405020304" pitchFamily="18" charset="0"/>
-                            </a:rPr>
-                            <m:t>𝑟</m:t>
-                          </m:r>
-                        </m:e>
-                        <m:sub>
-                          <m:r>
-                            <a:rPr lang="en-US" altLang="zh-CN" sz="2400" dirty="0">
-                              <a:latin typeface="Cambria Math" panose="02040503050406030204" pitchFamily="18" charset="0"/>
-                              <a:cs typeface="Times New Roman" panose="02020603050405020304" pitchFamily="18" charset="0"/>
-                            </a:rPr>
-                            <m:t>𝑦𝑦</m:t>
-                          </m:r>
-                        </m:sub>
-                      </m:sSub>
-                      <m:d>
-                        <m:dPr>
-                          <m:ctrlPr>
-                            <a:rPr lang="en-US" altLang="zh-CN" sz="2400" i="1" dirty="0">
-                              <a:latin typeface="Cambria Math" panose="02040503050406030204" pitchFamily="18" charset="0"/>
-                              <a:cs typeface="Times New Roman" panose="02020603050405020304" pitchFamily="18" charset="0"/>
-                            </a:rPr>
-                          </m:ctrlPr>
-                        </m:dPr>
-                        <m:e>
-                          <m:r>
-                            <a:rPr lang="en-US" altLang="zh-CN" sz="2400" dirty="0">
-                              <a:latin typeface="Cambria Math" panose="02040503050406030204" pitchFamily="18" charset="0"/>
-                              <a:cs typeface="Times New Roman" panose="02020603050405020304" pitchFamily="18" charset="0"/>
-                            </a:rPr>
-                            <m:t>𝑘</m:t>
-                          </m:r>
-                        </m:e>
-                      </m:d>
-                      <m:r>
-                        <a:rPr lang="en-US" altLang="zh-CN" sz="2400" dirty="0">
-                          <a:latin typeface="Cambria Math" panose="02040503050406030204" pitchFamily="18" charset="0"/>
-                          <a:cs typeface="Times New Roman" panose="02020603050405020304" pitchFamily="18" charset="0"/>
-                        </a:rPr>
-                        <m:t>−</m:t>
-                      </m:r>
-                      <m:sSub>
-                        <m:sSubPr>
-                          <m:ctrlPr>
-                            <a:rPr lang="en-US" altLang="zh-CN" sz="2400" i="1" dirty="0">
-                              <a:latin typeface="Cambria Math" panose="02040503050406030204" pitchFamily="18" charset="0"/>
-                              <a:cs typeface="Times New Roman" panose="02020603050405020304" pitchFamily="18" charset="0"/>
-                            </a:rPr>
-                          </m:ctrlPr>
-                        </m:sSubPr>
-                        <m:e>
-                          <m:r>
-                            <a:rPr lang="en-US" altLang="zh-CN" sz="2400" dirty="0">
-                              <a:latin typeface="Cambria Math" panose="02040503050406030204" pitchFamily="18" charset="0"/>
-                              <a:cs typeface="Times New Roman" panose="02020603050405020304" pitchFamily="18" charset="0"/>
-                            </a:rPr>
-                            <m:t>𝑟</m:t>
-                          </m:r>
-                        </m:e>
-                        <m:sub>
-                          <m:r>
-                            <a:rPr lang="en-US" altLang="zh-CN" sz="2400" dirty="0">
-                              <a:latin typeface="Cambria Math" panose="02040503050406030204" pitchFamily="18" charset="0"/>
-                              <a:cs typeface="Times New Roman" panose="02020603050405020304" pitchFamily="18" charset="0"/>
-                            </a:rPr>
-                            <m:t>𝑣𝑣</m:t>
-                          </m:r>
-                        </m:sub>
-                      </m:sSub>
-                      <m:d>
-                        <m:dPr>
-                          <m:ctrlPr>
-                            <a:rPr lang="en-US" altLang="zh-CN" sz="2400" i="1" dirty="0">
-                              <a:latin typeface="Cambria Math" panose="02040503050406030204" pitchFamily="18" charset="0"/>
-                              <a:cs typeface="Times New Roman" panose="02020603050405020304" pitchFamily="18" charset="0"/>
-                            </a:rPr>
-                          </m:ctrlPr>
-                        </m:dPr>
-                        <m:e>
-                          <m:r>
-                            <a:rPr lang="en-US" altLang="zh-CN" sz="2400" dirty="0">
-                              <a:latin typeface="Cambria Math" panose="02040503050406030204" pitchFamily="18" charset="0"/>
-                              <a:cs typeface="Times New Roman" panose="02020603050405020304" pitchFamily="18" charset="0"/>
-                            </a:rPr>
-                            <m:t>𝑘</m:t>
-                          </m:r>
-                        </m:e>
-                      </m:d>
-                    </m:oMath>
-                  </m:oMathPara>
-                </a14:m>
-                <a:endParaRPr lang="zh-CN" altLang="en-US" sz="2400" dirty="0">
-                  <a:latin typeface="CMU Serif" panose="02000603000000000000" pitchFamily="2" charset="0"/>
-                  <a:cs typeface="CMU Serif" panose="02000603000000000000" pitchFamily="2" charset="0"/>
-                </a:endParaRPr>
-              </a:p>
-            </p:txBody>
-          </p:sp>
-        </mc:Choice>
-        <mc:Fallback xmlns="">
-          <p:sp>
-            <p:nvSpPr>
-              <p:cNvPr id="16" name="文本框 15">
-                <a:extLst>
-                  <a:ext uri="{FF2B5EF4-FFF2-40B4-BE49-F238E27FC236}">
-                    <a16:creationId xmlns:a16="http://schemas.microsoft.com/office/drawing/2014/main" id="{0DC5694C-4D0C-59C2-BC43-7BCCEACC6F3E}"/>
-                  </a:ext>
-                </a:extLst>
-              </p:cNvPr>
-              <p:cNvSpPr txBox="1">
-                <a:spLocks noRot="1" noChangeAspect="1" noMove="1" noResize="1" noEditPoints="1" noAdjustHandles="1" noChangeArrowheads="1" noChangeShapeType="1" noTextEdit="1"/>
-              </p:cNvSpPr>
-              <p:nvPr/>
-            </p:nvSpPr>
-            <p:spPr>
-              <a:xfrm>
-                <a:off x="1646823" y="5056155"/>
-                <a:ext cx="6097002" cy="495457"/>
-              </a:xfrm>
-              <a:prstGeom prst="rect">
-                <a:avLst/>
-              </a:prstGeom>
-              <a:blipFill>
-                <a:blip r:embed="rId7"/>
-                <a:stretch>
-                  <a:fillRect b="-6098"/>
+                  <a:fillRect l="-844" t="-1220" b="-3659"/>
                 </a:stretch>
               </a:blipFill>
             </p:spPr>

</xml_diff>